<commit_message>
add the latest slide
</commit_message>
<xml_diff>
--- a/SlideDeck.pptx
+++ b/SlideDeck.pptx
@@ -23,21 +23,21 @@
     <p:sldId id="268" r:id="rId14"/>
     <p:sldId id="269" r:id="rId15"/>
     <p:sldId id="270" r:id="rId16"/>
-    <p:sldId id="271" r:id="rId17"/>
-    <p:sldId id="272" r:id="rId18"/>
-    <p:sldId id="273" r:id="rId19"/>
-    <p:sldId id="274" r:id="rId20"/>
-    <p:sldId id="275" r:id="rId21"/>
-    <p:sldId id="276" r:id="rId22"/>
-    <p:sldId id="277" r:id="rId23"/>
-    <p:sldId id="278" r:id="rId24"/>
+    <p:sldId id="285" r:id="rId17"/>
+    <p:sldId id="271" r:id="rId18"/>
+    <p:sldId id="272" r:id="rId19"/>
+    <p:sldId id="273" r:id="rId20"/>
+    <p:sldId id="274" r:id="rId21"/>
+    <p:sldId id="275" r:id="rId22"/>
+    <p:sldId id="276" r:id="rId23"/>
+    <p:sldId id="277" r:id="rId24"/>
     <p:sldId id="279" r:id="rId25"/>
     <p:sldId id="280" r:id="rId26"/>
-    <p:sldId id="281" r:id="rId27"/>
-    <p:sldId id="282" r:id="rId28"/>
-    <p:sldId id="283" r:id="rId29"/>
-    <p:sldId id="284" r:id="rId30"/>
-    <p:sldId id="285" r:id="rId31"/>
+    <p:sldId id="278" r:id="rId27"/>
+    <p:sldId id="281" r:id="rId28"/>
+    <p:sldId id="282" r:id="rId29"/>
+    <p:sldId id="283" r:id="rId30"/>
+    <p:sldId id="284" r:id="rId31"/>
     <p:sldId id="286" r:id="rId32"/>
     <p:sldId id="287" r:id="rId33"/>
     <p:sldId id="288" r:id="rId34"/>
@@ -53,44 +53,44 @@
   <p:notesSz cx="6858000" cy="9144000"/>
   <p:embeddedFontLst>
     <p:embeddedFont>
+      <p:font typeface="Muli" panose="020B0604020202020204" charset="0"/>
+      <p:regular r:id="rId43"/>
+      <p:italic r:id="rId44"/>
+    </p:embeddedFont>
+    <p:embeddedFont>
+      <p:font typeface="Segoe UI Semibold" panose="020B0702040204020203" pitchFamily="34" charset="0"/>
+      <p:bold r:id="rId45"/>
+      <p:boldItalic r:id="rId46"/>
+    </p:embeddedFont>
+    <p:embeddedFont>
+      <p:font typeface="Consolas" panose="020B0609020204030204" pitchFamily="49" charset="0"/>
+      <p:regular r:id="rId47"/>
+      <p:bold r:id="rId48"/>
+      <p:italic r:id="rId49"/>
+      <p:boldItalic r:id="rId50"/>
+    </p:embeddedFont>
+    <p:embeddedFont>
       <p:font typeface="Nixie One" panose="020B0604020202020204" charset="0"/>
-      <p:regular r:id="rId43"/>
+      <p:regular r:id="rId51"/>
+    </p:embeddedFont>
+    <p:embeddedFont>
+      <p:font typeface="Segoe UI Light" panose="020B0502040204020203" pitchFamily="34" charset="0"/>
+      <p:regular r:id="rId52"/>
+      <p:italic r:id="rId53"/>
+    </p:embeddedFont>
+    <p:embeddedFont>
+      <p:font typeface="Segoe UI" panose="020B0502040204020203" pitchFamily="34" charset="0"/>
+      <p:regular r:id="rId54"/>
+      <p:bold r:id="rId55"/>
+      <p:italic r:id="rId56"/>
+      <p:boldItalic r:id="rId57"/>
+    </p:embeddedFont>
+    <p:embeddedFont>
+      <p:font typeface="MS PGothic" panose="020B0600070205080204" pitchFamily="34" charset="-128"/>
+      <p:regular r:id="rId58"/>
     </p:embeddedFont>
     <p:embeddedFont>
       <p:font typeface="Segoe UI Semilight" panose="020B0402040204020203" pitchFamily="34" charset="0"/>
-      <p:regular r:id="rId44"/>
-      <p:italic r:id="rId45"/>
-    </p:embeddedFont>
-    <p:embeddedFont>
-      <p:font typeface="Segoe UI Semibold" panose="020B0702040204020203" pitchFamily="34" charset="0"/>
-      <p:bold r:id="rId46"/>
-      <p:boldItalic r:id="rId47"/>
-    </p:embeddedFont>
-    <p:embeddedFont>
-      <p:font typeface="Consolas" panose="020B0609020204030204" pitchFamily="49" charset="0"/>
-      <p:regular r:id="rId48"/>
-      <p:bold r:id="rId49"/>
-      <p:italic r:id="rId50"/>
-      <p:boldItalic r:id="rId51"/>
-    </p:embeddedFont>
-    <p:embeddedFont>
-      <p:font typeface="MS PGothic" panose="020B0600070205080204" pitchFamily="34" charset="-128"/>
-      <p:regular r:id="rId52"/>
-    </p:embeddedFont>
-    <p:embeddedFont>
-      <p:font typeface="Segoe UI Light" panose="020B0502040204020203" pitchFamily="34" charset="0"/>
-      <p:regular r:id="rId53"/>
-      <p:italic r:id="rId54"/>
-    </p:embeddedFont>
-    <p:embeddedFont>
-      <p:font typeface="Segoe UI" panose="020B0502040204020203" pitchFamily="34" charset="0"/>
-      <p:regular r:id="rId55"/>
-      <p:bold r:id="rId56"/>
-      <p:italic r:id="rId57"/>
-      <p:boldItalic r:id="rId58"/>
-    </p:embeddedFont>
-    <p:embeddedFont>
-      <p:font typeface="Muli" panose="020B0604020202020204" charset="0"/>
       <p:regular r:id="rId59"/>
       <p:italic r:id="rId60"/>
     </p:embeddedFont>
@@ -899,7 +899,7 @@
                 <a:tabLst/>
                 <a:defRPr/>
               </a:pPr>
-              <a:t>10/18/2016 9:37 PM</a:t>
+              <a:t>10/22/2016 11:52 AM</a:t>
             </a:fld>
             <a:endParaRPr kumimoji="0" lang="en-US" sz="1200" b="0" i="0" u="none" strike="noStrike" kern="1200" cap="none" spc="0" normalizeH="0" baseline="0" noProof="0" dirty="0">
               <a:ln>
@@ -9314,6 +9314,66 @@
           </a:p>
         </p:txBody>
       </p:sp>
+      <p:pic>
+        <p:nvPicPr>
+          <p:cNvPr id="5" name="Picture 4"/>
+          <p:cNvPicPr>
+            <a:picLocks noChangeAspect="1"/>
+          </p:cNvPicPr>
+          <p:nvPr/>
+        </p:nvPicPr>
+        <p:blipFill>
+          <a:blip r:embed="rId3">
+            <a:extLst>
+              <a:ext uri="{28A0092B-C50C-407E-A947-70E740481C1C}">
+                <a14:useLocalDpi xmlns:a14="http://schemas.microsoft.com/office/drawing/2010/main" val="0"/>
+              </a:ext>
+            </a:extLst>
+          </a:blip>
+          <a:stretch>
+            <a:fillRect/>
+          </a:stretch>
+        </p:blipFill>
+        <p:spPr>
+          <a:xfrm>
+            <a:off x="8057111" y="3880317"/>
+            <a:ext cx="945573" cy="378229"/>
+          </a:xfrm>
+          <a:prstGeom prst="rect">
+            <a:avLst/>
+          </a:prstGeom>
+        </p:spPr>
+      </p:pic>
+      <p:pic>
+        <p:nvPicPr>
+          <p:cNvPr id="6" name="Picture 5"/>
+          <p:cNvPicPr>
+            <a:picLocks noChangeAspect="1"/>
+          </p:cNvPicPr>
+          <p:nvPr/>
+        </p:nvPicPr>
+        <p:blipFill>
+          <a:blip r:embed="rId4">
+            <a:extLst>
+              <a:ext uri="{28A0092B-C50C-407E-A947-70E740481C1C}">
+                <a14:useLocalDpi xmlns:a14="http://schemas.microsoft.com/office/drawing/2010/main" val="0"/>
+              </a:ext>
+            </a:extLst>
+          </a:blip>
+          <a:stretch>
+            <a:fillRect/>
+          </a:stretch>
+        </p:blipFill>
+        <p:spPr>
+          <a:xfrm>
+            <a:off x="166254" y="1939948"/>
+            <a:ext cx="1859284" cy="2453645"/>
+          </a:xfrm>
+          <a:prstGeom prst="rect">
+            <a:avLst/>
+          </a:prstGeom>
+        </p:spPr>
+      </p:pic>
     </p:spTree>
     <p:extLst>
       <p:ext uri="{BB962C8B-B14F-4D97-AF65-F5344CB8AC3E}">
@@ -9324,13 +9384,13 @@
   <p:clrMapOvr>
     <a:masterClrMapping/>
   </p:clrMapOvr>
-  <mc:AlternateContent xmlns:mc="http://schemas.openxmlformats.org/markup-compatibility/2006">
-    <mc:Choice xmlns:p14="http://schemas.microsoft.com/office/powerpoint/2010/main" Requires="p14">
+  <mc:AlternateContent xmlns:mc="http://schemas.openxmlformats.org/markup-compatibility/2006" xmlns:p14="http://schemas.microsoft.com/office/powerpoint/2010/main">
+    <mc:Choice Requires="p14">
       <p:transition spd="med" p14:dur="700">
         <p:fade/>
       </p:transition>
     </mc:Choice>
-    <mc:Fallback>
+    <mc:Fallback xmlns="">
       <p:transition spd="med">
         <p:fade/>
       </p:transition>
@@ -9437,13 +9497,13 @@
   <p:clrMapOvr>
     <a:masterClrMapping/>
   </p:clrMapOvr>
-  <mc:AlternateContent xmlns:mc="http://schemas.openxmlformats.org/markup-compatibility/2006">
-    <mc:Choice xmlns:p14="http://schemas.microsoft.com/office/powerpoint/2010/main" Requires="p14">
+  <mc:AlternateContent xmlns:mc="http://schemas.openxmlformats.org/markup-compatibility/2006" xmlns:p14="http://schemas.microsoft.com/office/powerpoint/2010/main">
+    <mc:Choice Requires="p14">
       <p:transition spd="med" p14:dur="700">
         <p:fade/>
       </p:transition>
     </mc:Choice>
-    <mc:Fallback>
+    <mc:Fallback xmlns="">
       <p:transition spd="med">
         <p:fade/>
       </p:transition>
@@ -9588,13 +9648,13 @@
   <p:clrMapOvr>
     <a:masterClrMapping/>
   </p:clrMapOvr>
-  <mc:AlternateContent xmlns:mc="http://schemas.openxmlformats.org/markup-compatibility/2006">
-    <mc:Choice xmlns:p14="http://schemas.microsoft.com/office/powerpoint/2010/main" Requires="p14">
+  <mc:AlternateContent xmlns:mc="http://schemas.openxmlformats.org/markup-compatibility/2006" xmlns:p14="http://schemas.microsoft.com/office/powerpoint/2010/main">
+    <mc:Choice Requires="p14">
       <p:transition spd="med" p14:dur="700">
         <p:fade/>
       </p:transition>
     </mc:Choice>
-    <mc:Fallback>
+    <mc:Fallback xmlns="">
       <p:transition spd="med">
         <p:fade/>
       </p:transition>
@@ -10006,13 +10066,13 @@
   <p:clrMapOvr>
     <a:masterClrMapping/>
   </p:clrMapOvr>
-  <mc:AlternateContent xmlns:mc="http://schemas.openxmlformats.org/markup-compatibility/2006">
-    <mc:Choice xmlns:p14="http://schemas.microsoft.com/office/powerpoint/2010/main" Requires="p14">
+  <mc:AlternateContent xmlns:mc="http://schemas.openxmlformats.org/markup-compatibility/2006" xmlns:p14="http://schemas.microsoft.com/office/powerpoint/2010/main">
+    <mc:Choice Requires="p14">
       <p:transition spd="med" p14:dur="700">
         <p:fade/>
       </p:transition>
     </mc:Choice>
-    <mc:Fallback>
+    <mc:Fallback xmlns="">
       <p:transition spd="med">
         <p:fade/>
       </p:transition>
@@ -10204,13 +10264,13 @@
   <p:clrMapOvr>
     <a:masterClrMapping/>
   </p:clrMapOvr>
-  <mc:AlternateContent xmlns:mc="http://schemas.openxmlformats.org/markup-compatibility/2006">
-    <mc:Choice xmlns:p14="http://schemas.microsoft.com/office/powerpoint/2010/main" Requires="p14">
+  <mc:AlternateContent xmlns:mc="http://schemas.openxmlformats.org/markup-compatibility/2006" xmlns:p14="http://schemas.microsoft.com/office/powerpoint/2010/main">
+    <mc:Choice Requires="p14">
       <p:transition spd="med" p14:dur="700">
         <p:fade/>
       </p:transition>
     </mc:Choice>
-    <mc:Fallback>
+    <mc:Fallback xmlns="">
       <p:transition spd="med">
         <p:fade/>
       </p:transition>
@@ -10624,10 +10684,595 @@
           <a:lstStyle/>
           <a:p>
             <a:r>
-              <a:rPr lang="en-US" dirty="0" smtClean="0"/>
+              <a:rPr lang="en-US" dirty="0"/>
+              <a:t>Built over services</a:t>
+            </a:r>
+          </a:p>
+        </p:txBody>
+      </p:sp>
+      <p:sp>
+        <p:nvSpPr>
+          <p:cNvPr id="3" name="Rectangle 2"/>
+          <p:cNvSpPr/>
+          <p:nvPr/>
+        </p:nvSpPr>
+        <p:spPr bwMode="auto">
+          <a:xfrm>
+            <a:off x="426035" y="1003007"/>
+            <a:ext cx="8347956" cy="1154547"/>
+          </a:xfrm>
+          <a:prstGeom prst="rect">
+            <a:avLst/>
+          </a:prstGeom>
+          <a:solidFill>
+            <a:schemeClr val="accent1"/>
+          </a:solidFill>
+          <a:ln>
+            <a:headEnd type="none" w="med" len="med"/>
+            <a:tailEnd type="none" w="med" len="med"/>
+          </a:ln>
+        </p:spPr>
+        <p:style>
+          <a:lnRef idx="2">
+            <a:schemeClr val="accent1">
+              <a:shade val="50000"/>
+            </a:schemeClr>
+          </a:lnRef>
+          <a:fillRef idx="1">
+            <a:schemeClr val="accent1"/>
+          </a:fillRef>
+          <a:effectRef idx="0">
+            <a:schemeClr val="accent1"/>
+          </a:effectRef>
+          <a:fontRef idx="minor">
+            <a:schemeClr val="lt1"/>
+          </a:fontRef>
+        </p:style>
+        <p:txBody>
+          <a:bodyPr vert="horz" wrap="square" lIns="0" tIns="34290" rIns="0" bIns="34290" numCol="1" rtlCol="0" anchor="ctr" anchorCtr="0" compatLnSpc="1">
+            <a:prstTxWarp prst="textNoShape">
+              <a:avLst/>
+            </a:prstTxWarp>
+          </a:bodyPr>
+          <a:lstStyle/>
+          <a:p>
+            <a:pPr algn="ctr" defTabSz="685647" fontAlgn="base">
+              <a:spcBef>
+                <a:spcPct val="0"/>
+              </a:spcBef>
+              <a:spcAft>
+                <a:spcPct val="0"/>
+              </a:spcAft>
+            </a:pPr>
+            <a:r>
+              <a:rPr lang="en-US" sz="2941" dirty="0">
+                <a:solidFill>
+                  <a:schemeClr val="bg1"/>
+                </a:solidFill>
+              </a:rPr>
+              <a:t>Top Level API</a:t>
+            </a:r>
+            <a:br>
+              <a:rPr lang="en-US" sz="2941" dirty="0">
+                <a:solidFill>
+                  <a:schemeClr val="bg1"/>
+                </a:solidFill>
+              </a:rPr>
+            </a:br>
+            <a:r>
+              <a:rPr lang="en-US" sz="2059" dirty="0" err="1">
+                <a:solidFill>
+                  <a:schemeClr val="bg1"/>
+                </a:solidFill>
+              </a:rPr>
+              <a:t>DbContext</a:t>
+            </a:r>
+            <a:r>
+              <a:rPr lang="en-US" sz="2059" dirty="0">
+                <a:solidFill>
+                  <a:schemeClr val="bg1"/>
+                </a:solidFill>
+              </a:rPr>
+              <a:t>, </a:t>
+            </a:r>
+            <a:r>
+              <a:rPr lang="en-US" sz="2059" dirty="0" err="1">
+                <a:solidFill>
+                  <a:schemeClr val="bg1"/>
+                </a:solidFill>
+              </a:rPr>
+              <a:t>DbSet</a:t>
+            </a:r>
+            <a:r>
+              <a:rPr lang="en-US" sz="2059" dirty="0">
+                <a:solidFill>
+                  <a:schemeClr val="bg1"/>
+                </a:solidFill>
+              </a:rPr>
+              <a:t>, </a:t>
+            </a:r>
+            <a:r>
+              <a:rPr lang="en-US" sz="2059" dirty="0" err="1">
+                <a:solidFill>
+                  <a:schemeClr val="bg1"/>
+                </a:solidFill>
+              </a:rPr>
+              <a:t>ChangeTracker</a:t>
+            </a:r>
+            <a:r>
+              <a:rPr lang="en-US" sz="2059" dirty="0">
+                <a:solidFill>
+                  <a:schemeClr val="bg1"/>
+                </a:solidFill>
+              </a:rPr>
+              <a:t>, Database, etc.</a:t>
+            </a:r>
+          </a:p>
+        </p:txBody>
+      </p:sp>
+      <p:sp>
+        <p:nvSpPr>
+          <p:cNvPr id="4" name="Rectangle 3"/>
+          <p:cNvSpPr/>
+          <p:nvPr/>
+        </p:nvSpPr>
+        <p:spPr bwMode="auto">
+          <a:xfrm>
+            <a:off x="426035" y="2271212"/>
+            <a:ext cx="8347956" cy="1065736"/>
+          </a:xfrm>
+          <a:prstGeom prst="rect">
+            <a:avLst/>
+          </a:prstGeom>
+          <a:solidFill>
+            <a:schemeClr val="accent3"/>
+          </a:solidFill>
+          <a:ln>
+            <a:headEnd type="none" w="med" len="med"/>
+            <a:tailEnd type="none" w="med" len="med"/>
+          </a:ln>
+        </p:spPr>
+        <p:style>
+          <a:lnRef idx="2">
+            <a:schemeClr val="accent3">
+              <a:shade val="50000"/>
+            </a:schemeClr>
+          </a:lnRef>
+          <a:fillRef idx="1">
+            <a:schemeClr val="accent3"/>
+          </a:fillRef>
+          <a:effectRef idx="0">
+            <a:schemeClr val="accent3"/>
+          </a:effectRef>
+          <a:fontRef idx="minor">
+            <a:schemeClr val="lt1"/>
+          </a:fontRef>
+        </p:style>
+        <p:txBody>
+          <a:bodyPr vert="horz" wrap="square" lIns="0" tIns="34290" rIns="0" bIns="34290" numCol="1" rtlCol="0" anchor="ctr" anchorCtr="0" compatLnSpc="1">
+            <a:prstTxWarp prst="textNoShape">
+              <a:avLst/>
+            </a:prstTxWarp>
+          </a:bodyPr>
+          <a:lstStyle/>
+          <a:p>
+            <a:pPr algn="ctr" defTabSz="685647" fontAlgn="base">
+              <a:spcBef>
+                <a:spcPct val="0"/>
+              </a:spcBef>
+              <a:spcAft>
+                <a:spcPct val="0"/>
+              </a:spcAft>
+            </a:pPr>
+            <a:r>
+              <a:rPr lang="en-US" sz="2941" dirty="0">
+                <a:solidFill>
+                  <a:schemeClr val="bg1"/>
+                </a:solidFill>
+              </a:rPr>
+              <a:t>Common Services</a:t>
+            </a:r>
+            <a:br>
+              <a:rPr lang="en-US" sz="2941" dirty="0">
+                <a:solidFill>
+                  <a:schemeClr val="bg1"/>
+                </a:solidFill>
+              </a:rPr>
+            </a:br>
+            <a:r>
+              <a:rPr lang="en-US" sz="2059" dirty="0" err="1">
+                <a:solidFill>
+                  <a:schemeClr val="bg1"/>
+                </a:solidFill>
+              </a:rPr>
+              <a:t>StateManager</a:t>
+            </a:r>
+            <a:r>
+              <a:rPr lang="en-US" sz="2059" dirty="0">
+                <a:solidFill>
+                  <a:schemeClr val="bg1"/>
+                </a:solidFill>
+              </a:rPr>
+              <a:t>, </a:t>
+            </a:r>
+            <a:r>
+              <a:rPr lang="en-US" sz="2059" dirty="0" err="1">
+                <a:solidFill>
+                  <a:schemeClr val="bg1"/>
+                </a:solidFill>
+              </a:rPr>
+              <a:t>CompiledQueryCache</a:t>
+            </a:r>
+            <a:r>
+              <a:rPr lang="en-US" sz="2059" dirty="0">
+                <a:solidFill>
+                  <a:schemeClr val="bg1"/>
+                </a:solidFill>
+              </a:rPr>
+              <a:t>, etc.</a:t>
+            </a:r>
+          </a:p>
+        </p:txBody>
+      </p:sp>
+      <p:sp>
+        <p:nvSpPr>
+          <p:cNvPr id="5" name="Rectangle 4"/>
+          <p:cNvSpPr/>
+          <p:nvPr/>
+        </p:nvSpPr>
+        <p:spPr bwMode="auto">
+          <a:xfrm>
+            <a:off x="426035" y="3450606"/>
+            <a:ext cx="8347956" cy="1065736"/>
+          </a:xfrm>
+          <a:prstGeom prst="rect">
+            <a:avLst/>
+          </a:prstGeom>
+          <a:solidFill>
+            <a:schemeClr val="accent2"/>
+          </a:solidFill>
+          <a:ln>
+            <a:headEnd type="none" w="med" len="med"/>
+            <a:tailEnd type="none" w="med" len="med"/>
+          </a:ln>
+        </p:spPr>
+        <p:style>
+          <a:lnRef idx="2">
+            <a:schemeClr val="accent2">
+              <a:shade val="50000"/>
+            </a:schemeClr>
+          </a:lnRef>
+          <a:fillRef idx="1">
+            <a:schemeClr val="accent2"/>
+          </a:fillRef>
+          <a:effectRef idx="0">
+            <a:schemeClr val="accent2"/>
+          </a:effectRef>
+          <a:fontRef idx="minor">
+            <a:schemeClr val="lt1"/>
+          </a:fontRef>
+        </p:style>
+        <p:txBody>
+          <a:bodyPr vert="horz" wrap="square" lIns="0" tIns="34290" rIns="0" bIns="34290" numCol="1" rtlCol="0" anchor="ctr" anchorCtr="0" compatLnSpc="1">
+            <a:prstTxWarp prst="textNoShape">
+              <a:avLst/>
+            </a:prstTxWarp>
+          </a:bodyPr>
+          <a:lstStyle/>
+          <a:p>
+            <a:pPr algn="ctr" defTabSz="685647" fontAlgn="base">
+              <a:spcBef>
+                <a:spcPct val="0"/>
+              </a:spcBef>
+              <a:spcAft>
+                <a:spcPct val="0"/>
+              </a:spcAft>
+            </a:pPr>
+            <a:r>
+              <a:rPr lang="en-US" sz="2941" dirty="0">
+                <a:solidFill>
+                  <a:schemeClr val="bg1"/>
+                </a:solidFill>
+              </a:rPr>
+              <a:t>Provider Specific Services</a:t>
+            </a:r>
+            <a:br>
+              <a:rPr lang="en-US" sz="2941" dirty="0">
+                <a:solidFill>
+                  <a:schemeClr val="bg1"/>
+                </a:solidFill>
+              </a:rPr>
+            </a:br>
+            <a:r>
+              <a:rPr lang="en-US" sz="2059" dirty="0" err="1">
+                <a:solidFill>
+                  <a:schemeClr val="bg1"/>
+                </a:solidFill>
+              </a:rPr>
+              <a:t>SqlServerTypeMapper</a:t>
+            </a:r>
+            <a:r>
+              <a:rPr lang="en-US" sz="2059" dirty="0">
+                <a:solidFill>
+                  <a:schemeClr val="bg1"/>
+                </a:solidFill>
+              </a:rPr>
+              <a:t>, </a:t>
+            </a:r>
+            <a:r>
+              <a:rPr lang="en-US" sz="2059" dirty="0" err="1">
+                <a:solidFill>
+                  <a:schemeClr val="bg1"/>
+                </a:solidFill>
+              </a:rPr>
+              <a:t>SqlServerSqlGenerationHelper</a:t>
+            </a:r>
+            <a:r>
+              <a:rPr lang="en-US" sz="2059" dirty="0">
+                <a:solidFill>
+                  <a:schemeClr val="bg1"/>
+                </a:solidFill>
+              </a:rPr>
+              <a:t>, etc.</a:t>
+            </a:r>
+          </a:p>
+        </p:txBody>
+      </p:sp>
+    </p:spTree>
+    <p:extLst>
+      <p:ext uri="{BB962C8B-B14F-4D97-AF65-F5344CB8AC3E}">
+        <p14:creationId xmlns:p14="http://schemas.microsoft.com/office/powerpoint/2010/main" val="26381308"/>
+      </p:ext>
+    </p:extLst>
+  </p:cSld>
+  <p:clrMapOvr>
+    <a:masterClrMapping/>
+  </p:clrMapOvr>
+  <mc:AlternateContent xmlns:mc="http://schemas.openxmlformats.org/markup-compatibility/2006" xmlns:p14="http://schemas.microsoft.com/office/powerpoint/2010/main">
+    <mc:Choice Requires="p14">
+      <p:transition spd="med" p14:dur="700">
+        <p:fade/>
+      </p:transition>
+    </mc:Choice>
+    <mc:Fallback xmlns="">
+      <p:transition spd="med">
+        <p:fade/>
+      </p:transition>
+    </mc:Fallback>
+  </mc:AlternateContent>
+  <p:timing>
+    <p:tnLst>
+      <p:par>
+        <p:cTn id="1" dur="indefinite" restart="never" nodeType="tmRoot">
+          <p:childTnLst>
+            <p:seq concurrent="1" nextAc="seek">
+              <p:cTn id="2" dur="indefinite" nodeType="mainSeq">
+                <p:childTnLst>
+                  <p:par>
+                    <p:cTn id="3" fill="hold">
+                      <p:stCondLst>
+                        <p:cond delay="indefinite"/>
+                      </p:stCondLst>
+                      <p:childTnLst>
+                        <p:par>
+                          <p:cTn id="4" fill="hold">
+                            <p:stCondLst>
+                              <p:cond delay="0"/>
+                            </p:stCondLst>
+                            <p:childTnLst>
+                              <p:par>
+                                <p:cTn id="5" presetID="10" presetClass="entr" presetSubtype="0" fill="hold" grpId="0" nodeType="clickEffect">
+                                  <p:stCondLst>
+                                    <p:cond delay="0"/>
+                                  </p:stCondLst>
+                                  <p:childTnLst>
+                                    <p:set>
+                                      <p:cBhvr>
+                                        <p:cTn id="6" dur="1" fill="hold">
+                                          <p:stCondLst>
+                                            <p:cond delay="0"/>
+                                          </p:stCondLst>
+                                        </p:cTn>
+                                        <p:tgtEl>
+                                          <p:spTgt spid="3"/>
+                                        </p:tgtEl>
+                                        <p:attrNameLst>
+                                          <p:attrName>style.visibility</p:attrName>
+                                        </p:attrNameLst>
+                                      </p:cBhvr>
+                                      <p:to>
+                                        <p:strVal val="visible"/>
+                                      </p:to>
+                                    </p:set>
+                                    <p:animEffect transition="in" filter="fade">
+                                      <p:cBhvr>
+                                        <p:cTn id="7" dur="500"/>
+                                        <p:tgtEl>
+                                          <p:spTgt spid="3"/>
+                                        </p:tgtEl>
+                                      </p:cBhvr>
+                                    </p:animEffect>
+                                  </p:childTnLst>
+                                </p:cTn>
+                              </p:par>
+                            </p:childTnLst>
+                          </p:cTn>
+                        </p:par>
+                      </p:childTnLst>
+                    </p:cTn>
+                  </p:par>
+                  <p:par>
+                    <p:cTn id="8" fill="hold">
+                      <p:stCondLst>
+                        <p:cond delay="indefinite"/>
+                      </p:stCondLst>
+                      <p:childTnLst>
+                        <p:par>
+                          <p:cTn id="9" fill="hold">
+                            <p:stCondLst>
+                              <p:cond delay="0"/>
+                            </p:stCondLst>
+                            <p:childTnLst>
+                              <p:par>
+                                <p:cTn id="10" presetID="10" presetClass="entr" presetSubtype="0" fill="hold" grpId="0" nodeType="clickEffect">
+                                  <p:stCondLst>
+                                    <p:cond delay="0"/>
+                                  </p:stCondLst>
+                                  <p:childTnLst>
+                                    <p:set>
+                                      <p:cBhvr>
+                                        <p:cTn id="11" dur="1" fill="hold">
+                                          <p:stCondLst>
+                                            <p:cond delay="0"/>
+                                          </p:stCondLst>
+                                        </p:cTn>
+                                        <p:tgtEl>
+                                          <p:spTgt spid="4"/>
+                                        </p:tgtEl>
+                                        <p:attrNameLst>
+                                          <p:attrName>style.visibility</p:attrName>
+                                        </p:attrNameLst>
+                                      </p:cBhvr>
+                                      <p:to>
+                                        <p:strVal val="visible"/>
+                                      </p:to>
+                                    </p:set>
+                                    <p:animEffect transition="in" filter="fade">
+                                      <p:cBhvr>
+                                        <p:cTn id="12" dur="500"/>
+                                        <p:tgtEl>
+                                          <p:spTgt spid="4"/>
+                                        </p:tgtEl>
+                                      </p:cBhvr>
+                                    </p:animEffect>
+                                  </p:childTnLst>
+                                </p:cTn>
+                              </p:par>
+                            </p:childTnLst>
+                          </p:cTn>
+                        </p:par>
+                      </p:childTnLst>
+                    </p:cTn>
+                  </p:par>
+                  <p:par>
+                    <p:cTn id="13" fill="hold">
+                      <p:stCondLst>
+                        <p:cond delay="indefinite"/>
+                      </p:stCondLst>
+                      <p:childTnLst>
+                        <p:par>
+                          <p:cTn id="14" fill="hold">
+                            <p:stCondLst>
+                              <p:cond delay="0"/>
+                            </p:stCondLst>
+                            <p:childTnLst>
+                              <p:par>
+                                <p:cTn id="15" presetID="10" presetClass="entr" presetSubtype="0" fill="hold" grpId="0" nodeType="clickEffect">
+                                  <p:stCondLst>
+                                    <p:cond delay="0"/>
+                                  </p:stCondLst>
+                                  <p:childTnLst>
+                                    <p:set>
+                                      <p:cBhvr>
+                                        <p:cTn id="16" dur="1" fill="hold">
+                                          <p:stCondLst>
+                                            <p:cond delay="0"/>
+                                          </p:stCondLst>
+                                        </p:cTn>
+                                        <p:tgtEl>
+                                          <p:spTgt spid="5"/>
+                                        </p:tgtEl>
+                                        <p:attrNameLst>
+                                          <p:attrName>style.visibility</p:attrName>
+                                        </p:attrNameLst>
+                                      </p:cBhvr>
+                                      <p:to>
+                                        <p:strVal val="visible"/>
+                                      </p:to>
+                                    </p:set>
+                                    <p:animEffect transition="in" filter="fade">
+                                      <p:cBhvr>
+                                        <p:cTn id="17" dur="500"/>
+                                        <p:tgtEl>
+                                          <p:spTgt spid="5"/>
+                                        </p:tgtEl>
+                                      </p:cBhvr>
+                                    </p:animEffect>
+                                  </p:childTnLst>
+                                </p:cTn>
+                              </p:par>
+                            </p:childTnLst>
+                          </p:cTn>
+                        </p:par>
+                      </p:childTnLst>
+                    </p:cTn>
+                  </p:par>
+                </p:childTnLst>
+              </p:cTn>
+              <p:prevCondLst>
+                <p:cond evt="onPrev" delay="0">
+                  <p:tgtEl>
+                    <p:sldTgt/>
+                  </p:tgtEl>
+                </p:cond>
+              </p:prevCondLst>
+              <p:nextCondLst>
+                <p:cond evt="onNext" delay="0">
+                  <p:tgtEl>
+                    <p:sldTgt/>
+                  </p:tgtEl>
+                </p:cond>
+              </p:nextCondLst>
+            </p:seq>
+          </p:childTnLst>
+        </p:cTn>
+      </p:par>
+    </p:tnLst>
+    <p:bldLst>
+      <p:bldP spid="3" grpId="0" animBg="1"/>
+      <p:bldP spid="4" grpId="0" animBg="1"/>
+      <p:bldP spid="5" grpId="0" animBg="1"/>
+    </p:bldLst>
+  </p:timing>
+</p:sld>
+</file>
+
+<file path=ppt/slides/slide15.xml><?xml version="1.0" encoding="utf-8"?>
+<p:sld xmlns:a="http://schemas.openxmlformats.org/drawingml/2006/main" xmlns:r="http://schemas.openxmlformats.org/officeDocument/2006/relationships" xmlns:p="http://schemas.openxmlformats.org/presentationml/2006/main">
+  <p:cSld>
+    <p:spTree>
+      <p:nvGrpSpPr>
+        <p:cNvPr id="1" name=""/>
+        <p:cNvGrpSpPr/>
+        <p:nvPr/>
+      </p:nvGrpSpPr>
+      <p:grpSpPr>
+        <a:xfrm>
+          <a:off x="0" y="0"/>
+          <a:ext cx="0" cy="0"/>
+          <a:chOff x="0" y="0"/>
+          <a:chExt cx="0" cy="0"/>
+        </a:xfrm>
+      </p:grpSpPr>
+      <p:sp>
+        <p:nvSpPr>
+          <p:cNvPr id="2" name="Title 1"/>
+          <p:cNvSpPr>
+            <a:spLocks noGrp="1"/>
+          </p:cNvSpPr>
+          <p:nvPr>
+            <p:ph type="title"/>
+          </p:nvPr>
+        </p:nvSpPr>
+        <p:spPr/>
+        <p:txBody>
+          <a:bodyPr/>
+          <a:lstStyle/>
+          <a:p>
+            <a:r>
+              <a:rPr lang="en-US" dirty="0"/>
               <a:t>EF Core &amp; EF6.x</a:t>
             </a:r>
-            <a:endParaRPr lang="en-US" dirty="0"/>
           </a:p>
         </p:txBody>
       </p:sp>
@@ -10660,13 +11305,13 @@
   <p:clrMapOvr>
     <a:masterClrMapping/>
   </p:clrMapOvr>
-  <mc:AlternateContent xmlns:mc="http://schemas.openxmlformats.org/markup-compatibility/2006">
-    <mc:Choice xmlns:p14="http://schemas.microsoft.com/office/powerpoint/2010/main" Requires="p14">
+  <mc:AlternateContent xmlns:mc="http://schemas.openxmlformats.org/markup-compatibility/2006" xmlns:p14="http://schemas.microsoft.com/office/powerpoint/2010/main">
+    <mc:Choice Requires="p14">
       <p:transition spd="med" p14:dur="700">
         <p:fade/>
       </p:transition>
     </mc:Choice>
-    <mc:Fallback>
+    <mc:Fallback xmlns="">
       <p:transition spd="med">
         <p:fade/>
       </p:transition>
@@ -10682,7 +11327,7 @@
 </p:sld>
 </file>
 
-<file path=ppt/slides/slide15.xml><?xml version="1.0" encoding="utf-8"?>
+<file path=ppt/slides/slide16.xml><?xml version="1.0" encoding="utf-8"?>
 <p:sld xmlns:a="http://schemas.openxmlformats.org/drawingml/2006/main" xmlns:r="http://schemas.openxmlformats.org/officeDocument/2006/relationships" xmlns:p="http://schemas.openxmlformats.org/presentationml/2006/main">
   <p:cSld>
     <p:spTree>
@@ -10715,10 +11360,9 @@
           <a:lstStyle/>
           <a:p>
             <a:r>
-              <a:rPr lang="en-US" dirty="0" smtClean="0"/>
+              <a:rPr lang="en-US" dirty="0"/>
               <a:t>EF Core</a:t>
             </a:r>
-            <a:endParaRPr lang="en-US" dirty="0"/>
           </a:p>
         </p:txBody>
       </p:sp>
@@ -10741,7 +11385,7 @@
               <a:buNone/>
             </a:pPr>
             <a:r>
-              <a:rPr lang="en-US" dirty="0" smtClean="0">
+              <a:rPr lang="en-US" dirty="0">
                 <a:solidFill>
                   <a:srgbClr val="19BBD5"/>
                 </a:solidFill>
@@ -10755,7 +11399,7 @@
               <a:buNone/>
             </a:pPr>
             <a:r>
-              <a:rPr lang="en-US" sz="1400" dirty="0" smtClean="0">
+              <a:rPr lang="en-US" sz="1400" dirty="0">
                 <a:latin typeface="Muli" panose="020B0604020202020204" charset="0"/>
               </a:rPr>
               <a:t>Same top level experience as EF6.x </a:t>
@@ -10766,7 +11410,7 @@
               <a:buNone/>
             </a:pPr>
             <a:r>
-              <a:rPr lang="en-US" sz="1400" dirty="0" smtClean="0">
+              <a:rPr lang="en-US" sz="1400" dirty="0">
                 <a:latin typeface="Muli" panose="020B0604020202020204" charset="0"/>
               </a:rPr>
               <a:t>Not changing things just for the sake of it</a:t>
@@ -10776,7 +11420,7 @@
             <a:pPr>
               <a:buNone/>
             </a:pPr>
-            <a:endParaRPr lang="en-US" sz="1400" dirty="0" smtClean="0">
+            <a:endParaRPr lang="en-US" sz="1400" dirty="0">
               <a:gradFill>
                 <a:gsLst>
                   <a:gs pos="1250">
@@ -10796,7 +11440,7 @@
               <a:buNone/>
             </a:pPr>
             <a:r>
-              <a:rPr lang="en-US" dirty="0" smtClean="0">
+              <a:rPr lang="en-US" dirty="0">
                 <a:solidFill>
                   <a:srgbClr val="19BBD5"/>
                 </a:solidFill>
@@ -10850,13 +11494,13 @@
   <p:clrMapOvr>
     <a:masterClrMapping/>
   </p:clrMapOvr>
-  <mc:AlternateContent xmlns:mc="http://schemas.openxmlformats.org/markup-compatibility/2006">
-    <mc:Choice xmlns:p14="http://schemas.microsoft.com/office/powerpoint/2010/main" Requires="p14">
+  <mc:AlternateContent xmlns:mc="http://schemas.openxmlformats.org/markup-compatibility/2006" xmlns:p14="http://schemas.microsoft.com/office/powerpoint/2010/main">
+    <mc:Choice Requires="p14">
       <p:transition spd="med" p14:dur="700">
         <p:fade/>
       </p:transition>
     </mc:Choice>
-    <mc:Fallback>
+    <mc:Fallback xmlns="">
       <p:transition spd="med">
         <p:fade/>
       </p:transition>
@@ -11283,7 +11927,7 @@
 </p:sld>
 </file>
 
-<file path=ppt/slides/slide16.xml><?xml version="1.0" encoding="utf-8"?>
+<file path=ppt/slides/slide17.xml><?xml version="1.0" encoding="utf-8"?>
 <p:sld xmlns:a="http://schemas.openxmlformats.org/drawingml/2006/main" xmlns:r="http://schemas.openxmlformats.org/officeDocument/2006/relationships" xmlns:p="http://schemas.openxmlformats.org/presentationml/2006/main">
   <p:cSld>
     <p:spTree>
@@ -11484,13 +12128,13 @@
   <p:clrMapOvr>
     <a:masterClrMapping/>
   </p:clrMapOvr>
-  <mc:AlternateContent xmlns:mc="http://schemas.openxmlformats.org/markup-compatibility/2006">
-    <mc:Choice xmlns:p14="http://schemas.microsoft.com/office/powerpoint/2010/main" Requires="p14">
+  <mc:AlternateContent xmlns:mc="http://schemas.openxmlformats.org/markup-compatibility/2006" xmlns:p14="http://schemas.microsoft.com/office/powerpoint/2010/main">
+    <mc:Choice Requires="p14">
       <p:transition spd="med" p14:dur="700">
         <p:fade/>
       </p:transition>
     </mc:Choice>
-    <mc:Fallback>
+    <mc:Fallback xmlns="">
       <p:transition spd="med">
         <p:fade/>
       </p:transition>
@@ -11917,7 +12561,7 @@
 </p:sld>
 </file>
 
-<file path=ppt/slides/slide17.xml><?xml version="1.0" encoding="utf-8"?>
+<file path=ppt/slides/slide18.xml><?xml version="1.0" encoding="utf-8"?>
 <p:sld xmlns:a="http://schemas.openxmlformats.org/drawingml/2006/main" xmlns:r="http://schemas.openxmlformats.org/officeDocument/2006/relationships" xmlns:p="http://schemas.openxmlformats.org/presentationml/2006/main">
   <p:cSld>
     <p:spTree>
@@ -12217,13 +12861,13 @@
   <p:clrMapOvr>
     <a:masterClrMapping/>
   </p:clrMapOvr>
-  <mc:AlternateContent xmlns:mc="http://schemas.openxmlformats.org/markup-compatibility/2006">
-    <mc:Choice xmlns:p14="http://schemas.microsoft.com/office/powerpoint/2010/main" Requires="p14">
+  <mc:AlternateContent xmlns:mc="http://schemas.openxmlformats.org/markup-compatibility/2006" xmlns:p14="http://schemas.microsoft.com/office/powerpoint/2010/main">
+    <mc:Choice Requires="p14">
       <p:transition spd="med" p14:dur="700">
         <p:fade/>
       </p:transition>
     </mc:Choice>
-    <mc:Fallback>
+    <mc:Fallback xmlns="">
       <p:transition spd="med">
         <p:fade/>
       </p:transition>
@@ -12824,7 +13468,7 @@
 </p:sld>
 </file>
 
-<file path=ppt/slides/slide18.xml><?xml version="1.0" encoding="utf-8"?>
+<file path=ppt/slides/slide19.xml><?xml version="1.0" encoding="utf-8"?>
 <p:sld xmlns:a="http://schemas.openxmlformats.org/drawingml/2006/main" xmlns:r="http://schemas.openxmlformats.org/officeDocument/2006/relationships" xmlns:p="http://schemas.openxmlformats.org/presentationml/2006/main">
   <p:cSld>
     <p:spTree>
@@ -12892,13 +13536,13 @@
   <p:clrMapOvr>
     <a:masterClrMapping/>
   </p:clrMapOvr>
-  <mc:AlternateContent xmlns:mc="http://schemas.openxmlformats.org/markup-compatibility/2006">
-    <mc:Choice xmlns:p14="http://schemas.microsoft.com/office/powerpoint/2010/main" Requires="p14">
+  <mc:AlternateContent xmlns:mc="http://schemas.openxmlformats.org/markup-compatibility/2006" xmlns:p14="http://schemas.microsoft.com/office/powerpoint/2010/main">
+    <mc:Choice Requires="p14">
       <p:transition spd="med" p14:dur="700">
         <p:fade/>
       </p:transition>
     </mc:Choice>
-    <mc:Fallback>
+    <mc:Fallback xmlns="">
       <p:transition spd="med">
         <p:fade/>
       </p:transition>
@@ -12914,7 +13558,149 @@
 </p:sld>
 </file>
 
-<file path=ppt/slides/slide19.xml><?xml version="1.0" encoding="utf-8"?>
+<file path=ppt/slides/slide2.xml><?xml version="1.0" encoding="utf-8"?>
+<p:sld xmlns:a="http://schemas.openxmlformats.org/drawingml/2006/main" xmlns:r="http://schemas.openxmlformats.org/officeDocument/2006/relationships" xmlns:p="http://schemas.openxmlformats.org/presentationml/2006/main">
+  <p:cSld>
+    <p:spTree>
+      <p:nvGrpSpPr>
+        <p:cNvPr id="1" name=""/>
+        <p:cNvGrpSpPr/>
+        <p:nvPr/>
+      </p:nvGrpSpPr>
+      <p:grpSpPr>
+        <a:xfrm>
+          <a:off x="0" y="0"/>
+          <a:ext cx="0" cy="0"/>
+          <a:chOff x="0" y="0"/>
+          <a:chExt cx="0" cy="0"/>
+        </a:xfrm>
+      </p:grpSpPr>
+      <p:sp>
+        <p:nvSpPr>
+          <p:cNvPr id="3" name="Title 2"/>
+          <p:cNvSpPr>
+            <a:spLocks noGrp="1"/>
+          </p:cNvSpPr>
+          <p:nvPr>
+            <p:ph type="title"/>
+          </p:nvPr>
+        </p:nvSpPr>
+        <p:spPr/>
+        <p:txBody>
+          <a:bodyPr/>
+          <a:lstStyle/>
+          <a:p>
+            <a:r>
+              <a:rPr lang="en-US"/>
+              <a:t>Agenda</a:t>
+            </a:r>
+            <a:endParaRPr lang="en-US" dirty="0"/>
+          </a:p>
+        </p:txBody>
+      </p:sp>
+      <p:sp>
+        <p:nvSpPr>
+          <p:cNvPr id="2" name="Text Placeholder 1"/>
+          <p:cNvSpPr>
+            <a:spLocks noGrp="1"/>
+          </p:cNvSpPr>
+          <p:nvPr>
+            <p:ph sz="quarter" idx="11"/>
+          </p:nvPr>
+        </p:nvSpPr>
+        <p:spPr/>
+        <p:txBody>
+          <a:bodyPr/>
+          <a:lstStyle/>
+          <a:p>
+            <a:pPr>
+              <a:buNone/>
+            </a:pPr>
+            <a:r>
+              <a:rPr lang="en-US" dirty="0"/>
+              <a:t>Introducing EF Core</a:t>
+            </a:r>
+          </a:p>
+          <a:p>
+            <a:pPr>
+              <a:buNone/>
+            </a:pPr>
+            <a:r>
+              <a:rPr lang="en-US" dirty="0"/>
+              <a:t>EF Core &amp; EF6.x</a:t>
+            </a:r>
+          </a:p>
+          <a:p>
+            <a:pPr>
+              <a:buNone/>
+            </a:pPr>
+            <a:r>
+              <a:rPr lang="en-US" dirty="0"/>
+              <a:t>Demos</a:t>
+            </a:r>
+          </a:p>
+          <a:p>
+            <a:pPr>
+              <a:buNone/>
+            </a:pPr>
+            <a:r>
+              <a:rPr lang="en-US" dirty="0"/>
+              <a:t>EF Core 1.1</a:t>
+            </a:r>
+          </a:p>
+          <a:p>
+            <a:pPr>
+              <a:buNone/>
+            </a:pPr>
+            <a:r>
+              <a:rPr lang="en-US" dirty="0"/>
+              <a:t>More Demos</a:t>
+            </a:r>
+          </a:p>
+          <a:p>
+            <a:pPr>
+              <a:buNone/>
+            </a:pPr>
+            <a:r>
+              <a:rPr lang="en-US" dirty="0"/>
+              <a:t>Next steps</a:t>
+            </a:r>
+          </a:p>
+        </p:txBody>
+      </p:sp>
+    </p:spTree>
+    <p:extLst>
+      <p:ext uri="{BB962C8B-B14F-4D97-AF65-F5344CB8AC3E}">
+        <p14:creationId xmlns:p14="http://schemas.microsoft.com/office/powerpoint/2010/main" val="3956654653"/>
+      </p:ext>
+    </p:extLst>
+  </p:cSld>
+  <p:clrMapOvr>
+    <a:masterClrMapping/>
+  </p:clrMapOvr>
+  <mc:AlternateContent xmlns:mc="http://schemas.openxmlformats.org/markup-compatibility/2006" xmlns:p14="http://schemas.microsoft.com/office/powerpoint/2010/main">
+    <mc:Choice Requires="p14">
+      <p:transition spd="med" p14:dur="700">
+        <p:fade/>
+      </p:transition>
+    </mc:Choice>
+    <mc:Fallback xmlns="">
+      <p:transition spd="med">
+        <p:fade/>
+      </p:transition>
+    </mc:Fallback>
+  </mc:AlternateContent>
+  <p:timing>
+    <p:tnLst>
+      <p:par>
+        <p:cTn id="1" dur="indefinite" restart="never" nodeType="tmRoot"/>
+      </p:par>
+    </p:tnLst>
+  </p:timing>
+</p:sld>
+</file>
+
+<file path=ppt/slides/slide20.xml><?xml version="1.0" encoding="utf-8"?>
 <p:sld xmlns:a="http://schemas.openxmlformats.org/drawingml/2006/main" xmlns:r="http://schemas.openxmlformats.org/officeDocument/2006/relationships" xmlns:p="http://schemas.openxmlformats.org/presentationml/2006/main">
   <p:cSld>
     <p:spTree>
@@ -12966,17 +13752,16 @@
           <a:lstStyle/>
           <a:p>
             <a:r>
-              <a:rPr lang="en-US" dirty="0" smtClean="0"/>
+              <a:rPr lang="en-US" dirty="0"/>
               <a:t>Demo</a:t>
             </a:r>
             <a:br>
-              <a:rPr lang="en-US" dirty="0" smtClean="0"/>
+              <a:rPr lang="en-US" dirty="0"/>
             </a:br>
             <a:r>
-              <a:rPr lang="en-US" sz="2941" dirty="0" smtClean="0"/>
+              <a:rPr lang="en-US" sz="2941" dirty="0"/>
               <a:t>EF Core 101</a:t>
             </a:r>
-            <a:endParaRPr lang="en-US" sz="2941" dirty="0"/>
           </a:p>
         </p:txBody>
       </p:sp>
@@ -13044,149 +13829,7 @@
 </p:sld>
 </file>
 
-<file path=ppt/slides/slide2.xml><?xml version="1.0" encoding="utf-8"?>
-<p:sld xmlns:a="http://schemas.openxmlformats.org/drawingml/2006/main" xmlns:r="http://schemas.openxmlformats.org/officeDocument/2006/relationships" xmlns:p="http://schemas.openxmlformats.org/presentationml/2006/main">
-  <p:cSld>
-    <p:spTree>
-      <p:nvGrpSpPr>
-        <p:cNvPr id="1" name=""/>
-        <p:cNvGrpSpPr/>
-        <p:nvPr/>
-      </p:nvGrpSpPr>
-      <p:grpSpPr>
-        <a:xfrm>
-          <a:off x="0" y="0"/>
-          <a:ext cx="0" cy="0"/>
-          <a:chOff x="0" y="0"/>
-          <a:chExt cx="0" cy="0"/>
-        </a:xfrm>
-      </p:grpSpPr>
-      <p:sp>
-        <p:nvSpPr>
-          <p:cNvPr id="3" name="Title 2"/>
-          <p:cNvSpPr>
-            <a:spLocks noGrp="1"/>
-          </p:cNvSpPr>
-          <p:nvPr>
-            <p:ph type="title"/>
-          </p:nvPr>
-        </p:nvSpPr>
-        <p:spPr/>
-        <p:txBody>
-          <a:bodyPr/>
-          <a:lstStyle/>
-          <a:p>
-            <a:r>
-              <a:rPr lang="en-US"/>
-              <a:t>Agenda</a:t>
-            </a:r>
-            <a:endParaRPr lang="en-US" dirty="0"/>
-          </a:p>
-        </p:txBody>
-      </p:sp>
-      <p:sp>
-        <p:nvSpPr>
-          <p:cNvPr id="2" name="Text Placeholder 1"/>
-          <p:cNvSpPr>
-            <a:spLocks noGrp="1"/>
-          </p:cNvSpPr>
-          <p:nvPr>
-            <p:ph sz="quarter" idx="11"/>
-          </p:nvPr>
-        </p:nvSpPr>
-        <p:spPr/>
-        <p:txBody>
-          <a:bodyPr/>
-          <a:lstStyle/>
-          <a:p>
-            <a:pPr>
-              <a:buNone/>
-            </a:pPr>
-            <a:r>
-              <a:rPr lang="en-US" dirty="0"/>
-              <a:t>Introducing EF Core</a:t>
-            </a:r>
-          </a:p>
-          <a:p>
-            <a:pPr>
-              <a:buNone/>
-            </a:pPr>
-            <a:r>
-              <a:rPr lang="en-US" dirty="0"/>
-              <a:t>EF Core &amp; EF6.x</a:t>
-            </a:r>
-          </a:p>
-          <a:p>
-            <a:pPr>
-              <a:buNone/>
-            </a:pPr>
-            <a:r>
-              <a:rPr lang="en-US" dirty="0"/>
-              <a:t>Demos</a:t>
-            </a:r>
-          </a:p>
-          <a:p>
-            <a:pPr>
-              <a:buNone/>
-            </a:pPr>
-            <a:r>
-              <a:rPr lang="en-US" dirty="0"/>
-              <a:t>EF Core 1.1</a:t>
-            </a:r>
-          </a:p>
-          <a:p>
-            <a:pPr>
-              <a:buNone/>
-            </a:pPr>
-            <a:r>
-              <a:rPr lang="en-US" dirty="0"/>
-              <a:t>More Demos</a:t>
-            </a:r>
-          </a:p>
-          <a:p>
-            <a:pPr>
-              <a:buNone/>
-            </a:pPr>
-            <a:r>
-              <a:rPr lang="en-US" dirty="0"/>
-              <a:t>Next steps</a:t>
-            </a:r>
-          </a:p>
-        </p:txBody>
-      </p:sp>
-    </p:spTree>
-    <p:extLst>
-      <p:ext uri="{BB962C8B-B14F-4D97-AF65-F5344CB8AC3E}">
-        <p14:creationId xmlns:p14="http://schemas.microsoft.com/office/powerpoint/2010/main" val="3956654653"/>
-      </p:ext>
-    </p:extLst>
-  </p:cSld>
-  <p:clrMapOvr>
-    <a:masterClrMapping/>
-  </p:clrMapOvr>
-  <mc:AlternateContent xmlns:mc="http://schemas.openxmlformats.org/markup-compatibility/2006">
-    <mc:Choice xmlns:p14="http://schemas.microsoft.com/office/powerpoint/2010/main" Requires="p14">
-      <p:transition spd="med" p14:dur="700">
-        <p:fade/>
-      </p:transition>
-    </mc:Choice>
-    <mc:Fallback>
-      <p:transition spd="med">
-        <p:fade/>
-      </p:transition>
-    </mc:Fallback>
-  </mc:AlternateContent>
-  <p:timing>
-    <p:tnLst>
-      <p:par>
-        <p:cTn id="1" dur="indefinite" restart="never" nodeType="tmRoot"/>
-      </p:par>
-    </p:tnLst>
-  </p:timing>
-</p:sld>
-</file>
-
-<file path=ppt/slides/slide20.xml><?xml version="1.0" encoding="utf-8"?>
+<file path=ppt/slides/slide21.xml><?xml version="1.0" encoding="utf-8"?>
 <p:sld xmlns:a="http://schemas.openxmlformats.org/drawingml/2006/main" xmlns:r="http://schemas.openxmlformats.org/officeDocument/2006/relationships" xmlns:p="http://schemas.openxmlformats.org/presentationml/2006/main">
   <p:cSld>
     <p:spTree>
@@ -13283,135 +13926,6 @@
     <p:extLst>
       <p:ext uri="{BB962C8B-B14F-4D97-AF65-F5344CB8AC3E}">
         <p14:creationId xmlns:p14="http://schemas.microsoft.com/office/powerpoint/2010/main" val="729522877"/>
-      </p:ext>
-    </p:extLst>
-  </p:cSld>
-  <p:clrMapOvr>
-    <a:masterClrMapping/>
-  </p:clrMapOvr>
-  <mc:AlternateContent xmlns:mc="http://schemas.openxmlformats.org/markup-compatibility/2006" xmlns:p14="http://schemas.microsoft.com/office/powerpoint/2010/main">
-    <mc:Choice Requires="p14">
-      <p:transition spd="slow" p14:dur="2000">
-        <p14:reveal/>
-      </p:transition>
-    </mc:Choice>
-    <mc:Fallback xmlns="">
-      <p:transition spd="slow">
-        <p:fade/>
-      </p:transition>
-    </mc:Fallback>
-  </mc:AlternateContent>
-  <p:timing>
-    <p:tnLst>
-      <p:par>
-        <p:cTn id="1" dur="indefinite" restart="never" nodeType="tmRoot"/>
-      </p:par>
-    </p:tnLst>
-  </p:timing>
-</p:sld>
-</file>
-
-<file path=ppt/slides/slide21.xml><?xml version="1.0" encoding="utf-8"?>
-<p:sld xmlns:a="http://schemas.openxmlformats.org/drawingml/2006/main" xmlns:r="http://schemas.openxmlformats.org/officeDocument/2006/relationships" xmlns:p="http://schemas.openxmlformats.org/presentationml/2006/main">
-  <p:cSld>
-    <p:spTree>
-      <p:nvGrpSpPr>
-        <p:cNvPr id="1" name=""/>
-        <p:cNvGrpSpPr/>
-        <p:nvPr/>
-      </p:nvGrpSpPr>
-      <p:grpSpPr>
-        <a:xfrm>
-          <a:off x="0" y="0"/>
-          <a:ext cx="0" cy="0"/>
-          <a:chOff x="0" y="0"/>
-          <a:chExt cx="0" cy="0"/>
-        </a:xfrm>
-      </p:grpSpPr>
-      <p:sp>
-        <p:nvSpPr>
-          <p:cNvPr id="2" name="Text Placeholder 1"/>
-          <p:cNvSpPr>
-            <a:spLocks noGrp="1"/>
-          </p:cNvSpPr>
-          <p:nvPr>
-            <p:ph type="body" sz="quarter" idx="10"/>
-          </p:nvPr>
-        </p:nvSpPr>
-        <p:spPr/>
-        <p:txBody>
-          <a:bodyPr/>
-          <a:lstStyle/>
-          <a:p>
-            <a:endParaRPr lang="en-US"/>
-          </a:p>
-        </p:txBody>
-      </p:sp>
-      <p:sp>
-        <p:nvSpPr>
-          <p:cNvPr id="3" name="Title 2"/>
-          <p:cNvSpPr>
-            <a:spLocks noGrp="1"/>
-          </p:cNvSpPr>
-          <p:nvPr>
-            <p:ph type="title"/>
-          </p:nvPr>
-        </p:nvSpPr>
-        <p:spPr/>
-        <p:txBody>
-          <a:bodyPr/>
-          <a:lstStyle/>
-          <a:p>
-            <a:r>
-              <a:rPr lang="en-US" dirty="0"/>
-              <a:t>Demo</a:t>
-            </a:r>
-            <a:br>
-              <a:rPr lang="en-US" dirty="0"/>
-            </a:br>
-            <a:r>
-              <a:rPr lang="en-US" sz="2941" dirty="0"/>
-              <a:t>Model building pipeline</a:t>
-            </a:r>
-          </a:p>
-        </p:txBody>
-      </p:sp>
-      <p:pic>
-        <p:nvPicPr>
-          <p:cNvPr id="6" name="Content Placeholder 5" descr="ProcessMachine.png"/>
-          <p:cNvPicPr>
-            <a:picLocks noGrp="1" noChangeAspect="1"/>
-          </p:cNvPicPr>
-          <p:nvPr>
-            <p:ph sz="quarter" idx="11"/>
-          </p:nvPr>
-        </p:nvPicPr>
-        <p:blipFill>
-          <a:blip r:embed="rId2">
-            <a:extLst>
-              <a:ext uri="{28A0092B-C50C-407E-A947-70E740481C1C}">
-                <a14:useLocalDpi xmlns:a14="http://schemas.microsoft.com/office/drawing/2010/main" val="0"/>
-              </a:ext>
-            </a:extLst>
-          </a:blip>
-          <a:stretch>
-            <a:fillRect/>
-          </a:stretch>
-        </p:blipFill>
-        <p:spPr>
-          <a:xfrm>
-            <a:off x="290513" y="931177"/>
-            <a:ext cx="2627312" cy="2030195"/>
-          </a:xfrm>
-          <a:prstGeom prst="rect">
-            <a:avLst/>
-          </a:prstGeom>
-        </p:spPr>
-      </p:pic>
-    </p:spTree>
-    <p:extLst>
-      <p:ext uri="{BB962C8B-B14F-4D97-AF65-F5344CB8AC3E}">
-        <p14:creationId xmlns:p14="http://schemas.microsoft.com/office/powerpoint/2010/main" val="1525040594"/>
       </p:ext>
     </p:extLst>
   </p:cSld>
@@ -16128,6 +16642,135 @@
             </a:br>
             <a:r>
               <a:rPr lang="en-US" sz="2941" dirty="0"/>
+              <a:t>Model building pipeline</a:t>
+            </a:r>
+          </a:p>
+        </p:txBody>
+      </p:sp>
+      <p:pic>
+        <p:nvPicPr>
+          <p:cNvPr id="6" name="Content Placeholder 5" descr="ProcessMachine.png"/>
+          <p:cNvPicPr>
+            <a:picLocks noGrp="1" noChangeAspect="1"/>
+          </p:cNvPicPr>
+          <p:nvPr>
+            <p:ph sz="quarter" idx="11"/>
+          </p:nvPr>
+        </p:nvPicPr>
+        <p:blipFill>
+          <a:blip r:embed="rId2">
+            <a:extLst>
+              <a:ext uri="{28A0092B-C50C-407E-A947-70E740481C1C}">
+                <a14:useLocalDpi xmlns:a14="http://schemas.microsoft.com/office/drawing/2010/main" val="0"/>
+              </a:ext>
+            </a:extLst>
+          </a:blip>
+          <a:stretch>
+            <a:fillRect/>
+          </a:stretch>
+        </p:blipFill>
+        <p:spPr>
+          <a:xfrm>
+            <a:off x="290513" y="931177"/>
+            <a:ext cx="2627312" cy="2030195"/>
+          </a:xfrm>
+          <a:prstGeom prst="rect">
+            <a:avLst/>
+          </a:prstGeom>
+        </p:spPr>
+      </p:pic>
+    </p:spTree>
+    <p:extLst>
+      <p:ext uri="{BB962C8B-B14F-4D97-AF65-F5344CB8AC3E}">
+        <p14:creationId xmlns:p14="http://schemas.microsoft.com/office/powerpoint/2010/main" val="1525040594"/>
+      </p:ext>
+    </p:extLst>
+  </p:cSld>
+  <p:clrMapOvr>
+    <a:masterClrMapping/>
+  </p:clrMapOvr>
+  <mc:AlternateContent xmlns:mc="http://schemas.openxmlformats.org/markup-compatibility/2006" xmlns:p14="http://schemas.microsoft.com/office/powerpoint/2010/main">
+    <mc:Choice Requires="p14">
+      <p:transition spd="slow" p14:dur="2000">
+        <p14:reveal/>
+      </p:transition>
+    </mc:Choice>
+    <mc:Fallback xmlns="">
+      <p:transition spd="slow">
+        <p:fade/>
+      </p:transition>
+    </mc:Fallback>
+  </mc:AlternateContent>
+  <p:timing>
+    <p:tnLst>
+      <p:par>
+        <p:cTn id="1" dur="indefinite" restart="never" nodeType="tmRoot"/>
+      </p:par>
+    </p:tnLst>
+  </p:timing>
+</p:sld>
+</file>
+
+<file path=ppt/slides/slide25.xml><?xml version="1.0" encoding="utf-8"?>
+<p:sld xmlns:a="http://schemas.openxmlformats.org/drawingml/2006/main" xmlns:r="http://schemas.openxmlformats.org/officeDocument/2006/relationships" xmlns:p="http://schemas.openxmlformats.org/presentationml/2006/main">
+  <p:cSld>
+    <p:spTree>
+      <p:nvGrpSpPr>
+        <p:cNvPr id="1" name=""/>
+        <p:cNvGrpSpPr/>
+        <p:nvPr/>
+      </p:nvGrpSpPr>
+      <p:grpSpPr>
+        <a:xfrm>
+          <a:off x="0" y="0"/>
+          <a:ext cx="0" cy="0"/>
+          <a:chOff x="0" y="0"/>
+          <a:chExt cx="0" cy="0"/>
+        </a:xfrm>
+      </p:grpSpPr>
+      <p:sp>
+        <p:nvSpPr>
+          <p:cNvPr id="2" name="Text Placeholder 1"/>
+          <p:cNvSpPr>
+            <a:spLocks noGrp="1"/>
+          </p:cNvSpPr>
+          <p:nvPr>
+            <p:ph type="body" sz="quarter" idx="10"/>
+          </p:nvPr>
+        </p:nvSpPr>
+        <p:spPr/>
+        <p:txBody>
+          <a:bodyPr/>
+          <a:lstStyle/>
+          <a:p>
+            <a:endParaRPr lang="en-US"/>
+          </a:p>
+        </p:txBody>
+      </p:sp>
+      <p:sp>
+        <p:nvSpPr>
+          <p:cNvPr id="3" name="Title 2"/>
+          <p:cNvSpPr>
+            <a:spLocks noGrp="1"/>
+          </p:cNvSpPr>
+          <p:nvPr>
+            <p:ph type="title"/>
+          </p:nvPr>
+        </p:nvSpPr>
+        <p:spPr/>
+        <p:txBody>
+          <a:bodyPr/>
+          <a:lstStyle/>
+          <a:p>
+            <a:r>
+              <a:rPr lang="en-US" dirty="0"/>
+              <a:t>Demo</a:t>
+            </a:r>
+            <a:br>
+              <a:rPr lang="en-US" dirty="0"/>
+            </a:br>
+            <a:r>
+              <a:rPr lang="en-US" sz="2941" dirty="0"/>
               <a:t>Simplified metadata API</a:t>
             </a:r>
           </a:p>
@@ -16197,7 +16840,7 @@
 </p:sld>
 </file>
 
-<file path=ppt/slides/slide25.xml><?xml version="1.0" encoding="utf-8"?>
+<file path=ppt/slides/slide26.xml><?xml version="1.0" encoding="utf-8"?>
 <p:sld xmlns:a="http://schemas.openxmlformats.org/drawingml/2006/main" xmlns:r="http://schemas.openxmlformats.org/officeDocument/2006/relationships" xmlns:p="http://schemas.openxmlformats.org/presentationml/2006/main">
   <p:cSld>
     <p:spTree>
@@ -16298,128 +16941,6 @@
     <p:extLst>
       <p:ext uri="{BB962C8B-B14F-4D97-AF65-F5344CB8AC3E}">
         <p14:creationId xmlns:p14="http://schemas.microsoft.com/office/powerpoint/2010/main" val="709714548"/>
-      </p:ext>
-    </p:extLst>
-  </p:cSld>
-  <p:clrMapOvr>
-    <a:masterClrMapping/>
-  </p:clrMapOvr>
-  <mc:AlternateContent xmlns:mc="http://schemas.openxmlformats.org/markup-compatibility/2006" xmlns:p14="http://schemas.microsoft.com/office/powerpoint/2010/main">
-    <mc:Choice Requires="p14">
-      <p:transition spd="slow" p14:dur="2000">
-        <p14:reveal/>
-      </p:transition>
-    </mc:Choice>
-    <mc:Fallback xmlns="">
-      <p:transition spd="slow">
-        <p:fade/>
-      </p:transition>
-    </mc:Fallback>
-  </mc:AlternateContent>
-</p:sld>
-</file>
-
-<file path=ppt/slides/slide26.xml><?xml version="1.0" encoding="utf-8"?>
-<p:sld xmlns:a="http://schemas.openxmlformats.org/drawingml/2006/main" xmlns:r="http://schemas.openxmlformats.org/officeDocument/2006/relationships" xmlns:p="http://schemas.openxmlformats.org/presentationml/2006/main">
-  <p:cSld>
-    <p:spTree>
-      <p:nvGrpSpPr>
-        <p:cNvPr id="1" name=""/>
-        <p:cNvGrpSpPr/>
-        <p:nvPr/>
-      </p:nvGrpSpPr>
-      <p:grpSpPr>
-        <a:xfrm>
-          <a:off x="0" y="0"/>
-          <a:ext cx="0" cy="0"/>
-          <a:chOff x="0" y="0"/>
-          <a:chExt cx="0" cy="0"/>
-        </a:xfrm>
-      </p:grpSpPr>
-      <p:sp>
-        <p:nvSpPr>
-          <p:cNvPr id="2" name="Text Placeholder 1"/>
-          <p:cNvSpPr>
-            <a:spLocks noGrp="1"/>
-          </p:cNvSpPr>
-          <p:nvPr>
-            <p:ph type="body" sz="quarter" idx="10"/>
-          </p:nvPr>
-        </p:nvSpPr>
-        <p:spPr/>
-        <p:txBody>
-          <a:bodyPr/>
-          <a:lstStyle/>
-          <a:p>
-            <a:endParaRPr lang="en-US"/>
-          </a:p>
-        </p:txBody>
-      </p:sp>
-      <p:sp>
-        <p:nvSpPr>
-          <p:cNvPr id="3" name="Title 2"/>
-          <p:cNvSpPr>
-            <a:spLocks noGrp="1"/>
-          </p:cNvSpPr>
-          <p:nvPr>
-            <p:ph type="title"/>
-          </p:nvPr>
-        </p:nvSpPr>
-        <p:spPr/>
-        <p:txBody>
-          <a:bodyPr/>
-          <a:lstStyle/>
-          <a:p>
-            <a:r>
-              <a:rPr lang="en-US" dirty="0"/>
-              <a:t>Demo</a:t>
-            </a:r>
-            <a:br>
-              <a:rPr lang="en-US" dirty="0"/>
-            </a:br>
-            <a:r>
-              <a:rPr lang="en-US" sz="2941" dirty="0"/>
-              <a:t>Same model, multiple databases</a:t>
-            </a:r>
-          </a:p>
-        </p:txBody>
-      </p:sp>
-      <p:pic>
-        <p:nvPicPr>
-          <p:cNvPr id="6" name="Content Placeholder 5" descr="Data.png"/>
-          <p:cNvPicPr>
-            <a:picLocks noGrp="1" noChangeAspect="1"/>
-          </p:cNvPicPr>
-          <p:nvPr>
-            <p:ph sz="quarter" idx="11"/>
-          </p:nvPr>
-        </p:nvPicPr>
-        <p:blipFill>
-          <a:blip r:embed="rId2">
-            <a:extLst>
-              <a:ext uri="{28A0092B-C50C-407E-A947-70E740481C1C}">
-                <a14:useLocalDpi xmlns:a14="http://schemas.microsoft.com/office/drawing/2010/main" val="0"/>
-              </a:ext>
-            </a:extLst>
-          </a:blip>
-          <a:stretch>
-            <a:fillRect/>
-          </a:stretch>
-        </p:blipFill>
-        <p:spPr>
-          <a:xfrm>
-            <a:off x="290513" y="931177"/>
-            <a:ext cx="2627312" cy="2030195"/>
-          </a:xfrm>
-          <a:prstGeom prst="rect">
-            <a:avLst/>
-          </a:prstGeom>
-        </p:spPr>
-      </p:pic>
-    </p:spTree>
-    <p:extLst>
-      <p:ext uri="{BB962C8B-B14F-4D97-AF65-F5344CB8AC3E}">
-        <p14:creationId xmlns:p14="http://schemas.microsoft.com/office/powerpoint/2010/main" val="1615394722"/>
       </p:ext>
     </p:extLst>
   </p:cSld>
@@ -16508,6 +17029,128 @@
             </a:br>
             <a:r>
               <a:rPr lang="en-US" sz="2941" dirty="0"/>
+              <a:t>Same model, multiple databases</a:t>
+            </a:r>
+          </a:p>
+        </p:txBody>
+      </p:sp>
+      <p:pic>
+        <p:nvPicPr>
+          <p:cNvPr id="6" name="Content Placeholder 5" descr="Data.png"/>
+          <p:cNvPicPr>
+            <a:picLocks noGrp="1" noChangeAspect="1"/>
+          </p:cNvPicPr>
+          <p:nvPr>
+            <p:ph sz="quarter" idx="11"/>
+          </p:nvPr>
+        </p:nvPicPr>
+        <p:blipFill>
+          <a:blip r:embed="rId2">
+            <a:extLst>
+              <a:ext uri="{28A0092B-C50C-407E-A947-70E740481C1C}">
+                <a14:useLocalDpi xmlns:a14="http://schemas.microsoft.com/office/drawing/2010/main" val="0"/>
+              </a:ext>
+            </a:extLst>
+          </a:blip>
+          <a:stretch>
+            <a:fillRect/>
+          </a:stretch>
+        </p:blipFill>
+        <p:spPr>
+          <a:xfrm>
+            <a:off x="290513" y="931177"/>
+            <a:ext cx="2627312" cy="2030195"/>
+          </a:xfrm>
+          <a:prstGeom prst="rect">
+            <a:avLst/>
+          </a:prstGeom>
+        </p:spPr>
+      </p:pic>
+    </p:spTree>
+    <p:extLst>
+      <p:ext uri="{BB962C8B-B14F-4D97-AF65-F5344CB8AC3E}">
+        <p14:creationId xmlns:p14="http://schemas.microsoft.com/office/powerpoint/2010/main" val="1615394722"/>
+      </p:ext>
+    </p:extLst>
+  </p:cSld>
+  <p:clrMapOvr>
+    <a:masterClrMapping/>
+  </p:clrMapOvr>
+  <mc:AlternateContent xmlns:mc="http://schemas.openxmlformats.org/markup-compatibility/2006" xmlns:p14="http://schemas.microsoft.com/office/powerpoint/2010/main">
+    <mc:Choice Requires="p14">
+      <p:transition spd="slow" p14:dur="2000">
+        <p14:reveal/>
+      </p:transition>
+    </mc:Choice>
+    <mc:Fallback xmlns="">
+      <p:transition spd="slow">
+        <p:fade/>
+      </p:transition>
+    </mc:Fallback>
+  </mc:AlternateContent>
+</p:sld>
+</file>
+
+<file path=ppt/slides/slide28.xml><?xml version="1.0" encoding="utf-8"?>
+<p:sld xmlns:a="http://schemas.openxmlformats.org/drawingml/2006/main" xmlns:r="http://schemas.openxmlformats.org/officeDocument/2006/relationships" xmlns:p="http://schemas.openxmlformats.org/presentationml/2006/main">
+  <p:cSld>
+    <p:spTree>
+      <p:nvGrpSpPr>
+        <p:cNvPr id="1" name=""/>
+        <p:cNvGrpSpPr/>
+        <p:nvPr/>
+      </p:nvGrpSpPr>
+      <p:grpSpPr>
+        <a:xfrm>
+          <a:off x="0" y="0"/>
+          <a:ext cx="0" cy="0"/>
+          <a:chOff x="0" y="0"/>
+          <a:chExt cx="0" cy="0"/>
+        </a:xfrm>
+      </p:grpSpPr>
+      <p:sp>
+        <p:nvSpPr>
+          <p:cNvPr id="2" name="Text Placeholder 1"/>
+          <p:cNvSpPr>
+            <a:spLocks noGrp="1"/>
+          </p:cNvSpPr>
+          <p:nvPr>
+            <p:ph type="body" sz="quarter" idx="10"/>
+          </p:nvPr>
+        </p:nvSpPr>
+        <p:spPr/>
+        <p:txBody>
+          <a:bodyPr/>
+          <a:lstStyle/>
+          <a:p>
+            <a:endParaRPr lang="en-US"/>
+          </a:p>
+        </p:txBody>
+      </p:sp>
+      <p:sp>
+        <p:nvSpPr>
+          <p:cNvPr id="3" name="Title 2"/>
+          <p:cNvSpPr>
+            <a:spLocks noGrp="1"/>
+          </p:cNvSpPr>
+          <p:nvPr>
+            <p:ph type="title"/>
+          </p:nvPr>
+        </p:nvSpPr>
+        <p:spPr/>
+        <p:txBody>
+          <a:bodyPr/>
+          <a:lstStyle/>
+          <a:p>
+            <a:r>
+              <a:rPr lang="en-US" dirty="0"/>
+              <a:t>Demo</a:t>
+            </a:r>
+            <a:br>
+              <a:rPr lang="en-US" dirty="0"/>
+            </a:br>
+            <a:r>
+              <a:rPr lang="en-US" sz="2941" dirty="0"/>
               <a:t>Consuming low level services</a:t>
             </a:r>
           </a:p>
@@ -16567,599 +17210,6 @@
       </p:transition>
     </mc:Fallback>
   </mc:AlternateContent>
-  <p:timing>
-    <p:tnLst>
-      <p:par>
-        <p:cTn id="1" dur="indefinite" restart="never" nodeType="tmRoot"/>
-      </p:par>
-    </p:tnLst>
-  </p:timing>
-</p:sld>
-</file>
-
-<file path=ppt/slides/slide28.xml><?xml version="1.0" encoding="utf-8"?>
-<p:sld xmlns:a="http://schemas.openxmlformats.org/drawingml/2006/main" xmlns:r="http://schemas.openxmlformats.org/officeDocument/2006/relationships" xmlns:p="http://schemas.openxmlformats.org/presentationml/2006/main">
-  <p:cSld>
-    <p:spTree>
-      <p:nvGrpSpPr>
-        <p:cNvPr id="1" name=""/>
-        <p:cNvGrpSpPr/>
-        <p:nvPr/>
-      </p:nvGrpSpPr>
-      <p:grpSpPr>
-        <a:xfrm>
-          <a:off x="0" y="0"/>
-          <a:ext cx="0" cy="0"/>
-          <a:chOff x="0" y="0"/>
-          <a:chExt cx="0" cy="0"/>
-        </a:xfrm>
-      </p:grpSpPr>
-      <p:sp>
-        <p:nvSpPr>
-          <p:cNvPr id="2" name="Title 1"/>
-          <p:cNvSpPr>
-            <a:spLocks noGrp="1"/>
-          </p:cNvSpPr>
-          <p:nvPr>
-            <p:ph type="title"/>
-          </p:nvPr>
-        </p:nvSpPr>
-        <p:spPr/>
-        <p:txBody>
-          <a:bodyPr/>
-          <a:lstStyle/>
-          <a:p>
-            <a:r>
-              <a:rPr lang="en-US" dirty="0"/>
-              <a:t>Built over services</a:t>
-            </a:r>
-          </a:p>
-        </p:txBody>
-      </p:sp>
-      <p:sp>
-        <p:nvSpPr>
-          <p:cNvPr id="3" name="Rectangle 2"/>
-          <p:cNvSpPr/>
-          <p:nvPr/>
-        </p:nvSpPr>
-        <p:spPr bwMode="auto">
-          <a:xfrm>
-            <a:off x="426035" y="1003007"/>
-            <a:ext cx="8347956" cy="1154547"/>
-          </a:xfrm>
-          <a:prstGeom prst="rect">
-            <a:avLst/>
-          </a:prstGeom>
-          <a:solidFill>
-            <a:schemeClr val="accent1"/>
-          </a:solidFill>
-          <a:ln>
-            <a:headEnd type="none" w="med" len="med"/>
-            <a:tailEnd type="none" w="med" len="med"/>
-          </a:ln>
-        </p:spPr>
-        <p:style>
-          <a:lnRef idx="2">
-            <a:schemeClr val="accent1">
-              <a:shade val="50000"/>
-            </a:schemeClr>
-          </a:lnRef>
-          <a:fillRef idx="1">
-            <a:schemeClr val="accent1"/>
-          </a:fillRef>
-          <a:effectRef idx="0">
-            <a:schemeClr val="accent1"/>
-          </a:effectRef>
-          <a:fontRef idx="minor">
-            <a:schemeClr val="lt1"/>
-          </a:fontRef>
-        </p:style>
-        <p:txBody>
-          <a:bodyPr vert="horz" wrap="square" lIns="0" tIns="34290" rIns="0" bIns="34290" numCol="1" rtlCol="0" anchor="ctr" anchorCtr="0" compatLnSpc="1">
-            <a:prstTxWarp prst="textNoShape">
-              <a:avLst/>
-            </a:prstTxWarp>
-          </a:bodyPr>
-          <a:lstStyle/>
-          <a:p>
-            <a:pPr algn="ctr" defTabSz="685647" fontAlgn="base">
-              <a:spcBef>
-                <a:spcPct val="0"/>
-              </a:spcBef>
-              <a:spcAft>
-                <a:spcPct val="0"/>
-              </a:spcAft>
-            </a:pPr>
-            <a:r>
-              <a:rPr lang="en-US" sz="2941" dirty="0">
-                <a:solidFill>
-                  <a:schemeClr val="bg1"/>
-                </a:solidFill>
-              </a:rPr>
-              <a:t>Top Level API</a:t>
-            </a:r>
-            <a:br>
-              <a:rPr lang="en-US" sz="2941" dirty="0">
-                <a:solidFill>
-                  <a:schemeClr val="bg1"/>
-                </a:solidFill>
-              </a:rPr>
-            </a:br>
-            <a:r>
-              <a:rPr lang="en-US" sz="2059" dirty="0" err="1">
-                <a:solidFill>
-                  <a:schemeClr val="bg1"/>
-                </a:solidFill>
-              </a:rPr>
-              <a:t>DbContext</a:t>
-            </a:r>
-            <a:r>
-              <a:rPr lang="en-US" sz="2059" dirty="0">
-                <a:solidFill>
-                  <a:schemeClr val="bg1"/>
-                </a:solidFill>
-              </a:rPr>
-              <a:t>, </a:t>
-            </a:r>
-            <a:r>
-              <a:rPr lang="en-US" sz="2059" dirty="0" err="1">
-                <a:solidFill>
-                  <a:schemeClr val="bg1"/>
-                </a:solidFill>
-              </a:rPr>
-              <a:t>DbSet</a:t>
-            </a:r>
-            <a:r>
-              <a:rPr lang="en-US" sz="2059" dirty="0">
-                <a:solidFill>
-                  <a:schemeClr val="bg1"/>
-                </a:solidFill>
-              </a:rPr>
-              <a:t>, </a:t>
-            </a:r>
-            <a:r>
-              <a:rPr lang="en-US" sz="2059" dirty="0" err="1">
-                <a:solidFill>
-                  <a:schemeClr val="bg1"/>
-                </a:solidFill>
-              </a:rPr>
-              <a:t>ChangeTracker</a:t>
-            </a:r>
-            <a:r>
-              <a:rPr lang="en-US" sz="2059" dirty="0">
-                <a:solidFill>
-                  <a:schemeClr val="bg1"/>
-                </a:solidFill>
-              </a:rPr>
-              <a:t>, Database, etc.</a:t>
-            </a:r>
-          </a:p>
-        </p:txBody>
-      </p:sp>
-      <p:sp>
-        <p:nvSpPr>
-          <p:cNvPr id="4" name="Rectangle 3"/>
-          <p:cNvSpPr/>
-          <p:nvPr/>
-        </p:nvSpPr>
-        <p:spPr bwMode="auto">
-          <a:xfrm>
-            <a:off x="426035" y="2271212"/>
-            <a:ext cx="8347956" cy="1065736"/>
-          </a:xfrm>
-          <a:prstGeom prst="rect">
-            <a:avLst/>
-          </a:prstGeom>
-          <a:solidFill>
-            <a:schemeClr val="accent3"/>
-          </a:solidFill>
-          <a:ln>
-            <a:headEnd type="none" w="med" len="med"/>
-            <a:tailEnd type="none" w="med" len="med"/>
-          </a:ln>
-        </p:spPr>
-        <p:style>
-          <a:lnRef idx="2">
-            <a:schemeClr val="accent3">
-              <a:shade val="50000"/>
-            </a:schemeClr>
-          </a:lnRef>
-          <a:fillRef idx="1">
-            <a:schemeClr val="accent3"/>
-          </a:fillRef>
-          <a:effectRef idx="0">
-            <a:schemeClr val="accent3"/>
-          </a:effectRef>
-          <a:fontRef idx="minor">
-            <a:schemeClr val="lt1"/>
-          </a:fontRef>
-        </p:style>
-        <p:txBody>
-          <a:bodyPr vert="horz" wrap="square" lIns="0" tIns="34290" rIns="0" bIns="34290" numCol="1" rtlCol="0" anchor="ctr" anchorCtr="0" compatLnSpc="1">
-            <a:prstTxWarp prst="textNoShape">
-              <a:avLst/>
-            </a:prstTxWarp>
-          </a:bodyPr>
-          <a:lstStyle/>
-          <a:p>
-            <a:pPr algn="ctr" defTabSz="685647" fontAlgn="base">
-              <a:spcBef>
-                <a:spcPct val="0"/>
-              </a:spcBef>
-              <a:spcAft>
-                <a:spcPct val="0"/>
-              </a:spcAft>
-            </a:pPr>
-            <a:r>
-              <a:rPr lang="en-US" sz="2941" dirty="0">
-                <a:solidFill>
-                  <a:schemeClr val="bg1"/>
-                </a:solidFill>
-              </a:rPr>
-              <a:t>Common Services</a:t>
-            </a:r>
-            <a:br>
-              <a:rPr lang="en-US" sz="2941" dirty="0">
-                <a:solidFill>
-                  <a:schemeClr val="bg1"/>
-                </a:solidFill>
-              </a:rPr>
-            </a:br>
-            <a:r>
-              <a:rPr lang="en-US" sz="2059" dirty="0" err="1">
-                <a:solidFill>
-                  <a:schemeClr val="bg1"/>
-                </a:solidFill>
-              </a:rPr>
-              <a:t>StateManager</a:t>
-            </a:r>
-            <a:r>
-              <a:rPr lang="en-US" sz="2059" dirty="0">
-                <a:solidFill>
-                  <a:schemeClr val="bg1"/>
-                </a:solidFill>
-              </a:rPr>
-              <a:t>, </a:t>
-            </a:r>
-            <a:r>
-              <a:rPr lang="en-US" sz="2059" dirty="0" err="1">
-                <a:solidFill>
-                  <a:schemeClr val="bg1"/>
-                </a:solidFill>
-              </a:rPr>
-              <a:t>CompiledQueryCache</a:t>
-            </a:r>
-            <a:r>
-              <a:rPr lang="en-US" sz="2059" dirty="0">
-                <a:solidFill>
-                  <a:schemeClr val="bg1"/>
-                </a:solidFill>
-              </a:rPr>
-              <a:t>, etc.</a:t>
-            </a:r>
-          </a:p>
-        </p:txBody>
-      </p:sp>
-      <p:sp>
-        <p:nvSpPr>
-          <p:cNvPr id="5" name="Rectangle 4"/>
-          <p:cNvSpPr/>
-          <p:nvPr/>
-        </p:nvSpPr>
-        <p:spPr bwMode="auto">
-          <a:xfrm>
-            <a:off x="426035" y="3450606"/>
-            <a:ext cx="8347956" cy="1065736"/>
-          </a:xfrm>
-          <a:prstGeom prst="rect">
-            <a:avLst/>
-          </a:prstGeom>
-          <a:solidFill>
-            <a:schemeClr val="accent2"/>
-          </a:solidFill>
-          <a:ln>
-            <a:headEnd type="none" w="med" len="med"/>
-            <a:tailEnd type="none" w="med" len="med"/>
-          </a:ln>
-        </p:spPr>
-        <p:style>
-          <a:lnRef idx="2">
-            <a:schemeClr val="accent2">
-              <a:shade val="50000"/>
-            </a:schemeClr>
-          </a:lnRef>
-          <a:fillRef idx="1">
-            <a:schemeClr val="accent2"/>
-          </a:fillRef>
-          <a:effectRef idx="0">
-            <a:schemeClr val="accent2"/>
-          </a:effectRef>
-          <a:fontRef idx="minor">
-            <a:schemeClr val="lt1"/>
-          </a:fontRef>
-        </p:style>
-        <p:txBody>
-          <a:bodyPr vert="horz" wrap="square" lIns="0" tIns="34290" rIns="0" bIns="34290" numCol="1" rtlCol="0" anchor="ctr" anchorCtr="0" compatLnSpc="1">
-            <a:prstTxWarp prst="textNoShape">
-              <a:avLst/>
-            </a:prstTxWarp>
-          </a:bodyPr>
-          <a:lstStyle/>
-          <a:p>
-            <a:pPr algn="ctr" defTabSz="685647" fontAlgn="base">
-              <a:spcBef>
-                <a:spcPct val="0"/>
-              </a:spcBef>
-              <a:spcAft>
-                <a:spcPct val="0"/>
-              </a:spcAft>
-            </a:pPr>
-            <a:r>
-              <a:rPr lang="en-US" sz="2941" dirty="0">
-                <a:solidFill>
-                  <a:schemeClr val="bg1"/>
-                </a:solidFill>
-              </a:rPr>
-              <a:t>Provider Specific Services</a:t>
-            </a:r>
-            <a:br>
-              <a:rPr lang="en-US" sz="2941" dirty="0">
-                <a:solidFill>
-                  <a:schemeClr val="bg1"/>
-                </a:solidFill>
-              </a:rPr>
-            </a:br>
-            <a:r>
-              <a:rPr lang="en-US" sz="2059" dirty="0" err="1">
-                <a:solidFill>
-                  <a:schemeClr val="bg1"/>
-                </a:solidFill>
-              </a:rPr>
-              <a:t>SqlServerTypeMapper</a:t>
-            </a:r>
-            <a:r>
-              <a:rPr lang="en-US" sz="2059" dirty="0">
-                <a:solidFill>
-                  <a:schemeClr val="bg1"/>
-                </a:solidFill>
-              </a:rPr>
-              <a:t>, </a:t>
-            </a:r>
-            <a:r>
-              <a:rPr lang="en-US" sz="2059" dirty="0" err="1">
-                <a:solidFill>
-                  <a:schemeClr val="bg1"/>
-                </a:solidFill>
-              </a:rPr>
-              <a:t>SqlServerSqlGenerationHelper</a:t>
-            </a:r>
-            <a:r>
-              <a:rPr lang="en-US" sz="2059" dirty="0">
-                <a:solidFill>
-                  <a:schemeClr val="bg1"/>
-                </a:solidFill>
-              </a:rPr>
-              <a:t>, etc.</a:t>
-            </a:r>
-          </a:p>
-        </p:txBody>
-      </p:sp>
-    </p:spTree>
-    <p:extLst>
-      <p:ext uri="{BB962C8B-B14F-4D97-AF65-F5344CB8AC3E}">
-        <p14:creationId xmlns:p14="http://schemas.microsoft.com/office/powerpoint/2010/main" val="26381308"/>
-      </p:ext>
-    </p:extLst>
-  </p:cSld>
-  <p:clrMapOvr>
-    <a:masterClrMapping/>
-  </p:clrMapOvr>
-  <mc:AlternateContent xmlns:mc="http://schemas.openxmlformats.org/markup-compatibility/2006">
-    <mc:Choice xmlns:p14="http://schemas.microsoft.com/office/powerpoint/2010/main" Requires="p14">
-      <p:transition spd="med" p14:dur="700">
-        <p:fade/>
-      </p:transition>
-    </mc:Choice>
-    <mc:Fallback>
-      <p:transition spd="med">
-        <p:fade/>
-      </p:transition>
-    </mc:Fallback>
-  </mc:AlternateContent>
-  <p:timing>
-    <p:tnLst>
-      <p:par>
-        <p:cTn id="1" dur="indefinite" restart="never" nodeType="tmRoot">
-          <p:childTnLst>
-            <p:seq concurrent="1" nextAc="seek">
-              <p:cTn id="2" dur="indefinite" nodeType="mainSeq">
-                <p:childTnLst>
-                  <p:par>
-                    <p:cTn id="3" fill="hold">
-                      <p:stCondLst>
-                        <p:cond delay="indefinite"/>
-                      </p:stCondLst>
-                      <p:childTnLst>
-                        <p:par>
-                          <p:cTn id="4" fill="hold">
-                            <p:stCondLst>
-                              <p:cond delay="0"/>
-                            </p:stCondLst>
-                            <p:childTnLst>
-                              <p:par>
-                                <p:cTn id="5" presetID="10" presetClass="entr" presetSubtype="0" fill="hold" grpId="0" nodeType="clickEffect">
-                                  <p:stCondLst>
-                                    <p:cond delay="0"/>
-                                  </p:stCondLst>
-                                  <p:childTnLst>
-                                    <p:set>
-                                      <p:cBhvr>
-                                        <p:cTn id="6" dur="1" fill="hold">
-                                          <p:stCondLst>
-                                            <p:cond delay="0"/>
-                                          </p:stCondLst>
-                                        </p:cTn>
-                                        <p:tgtEl>
-                                          <p:spTgt spid="3"/>
-                                        </p:tgtEl>
-                                        <p:attrNameLst>
-                                          <p:attrName>style.visibility</p:attrName>
-                                        </p:attrNameLst>
-                                      </p:cBhvr>
-                                      <p:to>
-                                        <p:strVal val="visible"/>
-                                      </p:to>
-                                    </p:set>
-                                    <p:animEffect transition="in" filter="fade">
-                                      <p:cBhvr>
-                                        <p:cTn id="7" dur="500"/>
-                                        <p:tgtEl>
-                                          <p:spTgt spid="3"/>
-                                        </p:tgtEl>
-                                      </p:cBhvr>
-                                    </p:animEffect>
-                                  </p:childTnLst>
-                                </p:cTn>
-                              </p:par>
-                            </p:childTnLst>
-                          </p:cTn>
-                        </p:par>
-                      </p:childTnLst>
-                    </p:cTn>
-                  </p:par>
-                  <p:par>
-                    <p:cTn id="8" fill="hold">
-                      <p:stCondLst>
-                        <p:cond delay="indefinite"/>
-                      </p:stCondLst>
-                      <p:childTnLst>
-                        <p:par>
-                          <p:cTn id="9" fill="hold">
-                            <p:stCondLst>
-                              <p:cond delay="0"/>
-                            </p:stCondLst>
-                            <p:childTnLst>
-                              <p:par>
-                                <p:cTn id="10" presetID="10" presetClass="entr" presetSubtype="0" fill="hold" grpId="0" nodeType="clickEffect">
-                                  <p:stCondLst>
-                                    <p:cond delay="0"/>
-                                  </p:stCondLst>
-                                  <p:childTnLst>
-                                    <p:set>
-                                      <p:cBhvr>
-                                        <p:cTn id="11" dur="1" fill="hold">
-                                          <p:stCondLst>
-                                            <p:cond delay="0"/>
-                                          </p:stCondLst>
-                                        </p:cTn>
-                                        <p:tgtEl>
-                                          <p:spTgt spid="4"/>
-                                        </p:tgtEl>
-                                        <p:attrNameLst>
-                                          <p:attrName>style.visibility</p:attrName>
-                                        </p:attrNameLst>
-                                      </p:cBhvr>
-                                      <p:to>
-                                        <p:strVal val="visible"/>
-                                      </p:to>
-                                    </p:set>
-                                    <p:animEffect transition="in" filter="fade">
-                                      <p:cBhvr>
-                                        <p:cTn id="12" dur="500"/>
-                                        <p:tgtEl>
-                                          <p:spTgt spid="4"/>
-                                        </p:tgtEl>
-                                      </p:cBhvr>
-                                    </p:animEffect>
-                                  </p:childTnLst>
-                                </p:cTn>
-                              </p:par>
-                            </p:childTnLst>
-                          </p:cTn>
-                        </p:par>
-                      </p:childTnLst>
-                    </p:cTn>
-                  </p:par>
-                  <p:par>
-                    <p:cTn id="13" fill="hold">
-                      <p:stCondLst>
-                        <p:cond delay="indefinite"/>
-                      </p:stCondLst>
-                      <p:childTnLst>
-                        <p:par>
-                          <p:cTn id="14" fill="hold">
-                            <p:stCondLst>
-                              <p:cond delay="0"/>
-                            </p:stCondLst>
-                            <p:childTnLst>
-                              <p:par>
-                                <p:cTn id="15" presetID="10" presetClass="entr" presetSubtype="0" fill="hold" grpId="0" nodeType="clickEffect">
-                                  <p:stCondLst>
-                                    <p:cond delay="0"/>
-                                  </p:stCondLst>
-                                  <p:childTnLst>
-                                    <p:set>
-                                      <p:cBhvr>
-                                        <p:cTn id="16" dur="1" fill="hold">
-                                          <p:stCondLst>
-                                            <p:cond delay="0"/>
-                                          </p:stCondLst>
-                                        </p:cTn>
-                                        <p:tgtEl>
-                                          <p:spTgt spid="5"/>
-                                        </p:tgtEl>
-                                        <p:attrNameLst>
-                                          <p:attrName>style.visibility</p:attrName>
-                                        </p:attrNameLst>
-                                      </p:cBhvr>
-                                      <p:to>
-                                        <p:strVal val="visible"/>
-                                      </p:to>
-                                    </p:set>
-                                    <p:animEffect transition="in" filter="fade">
-                                      <p:cBhvr>
-                                        <p:cTn id="17" dur="500"/>
-                                        <p:tgtEl>
-                                          <p:spTgt spid="5"/>
-                                        </p:tgtEl>
-                                      </p:cBhvr>
-                                    </p:animEffect>
-                                  </p:childTnLst>
-                                </p:cTn>
-                              </p:par>
-                            </p:childTnLst>
-                          </p:cTn>
-                        </p:par>
-                      </p:childTnLst>
-                    </p:cTn>
-                  </p:par>
-                </p:childTnLst>
-              </p:cTn>
-              <p:prevCondLst>
-                <p:cond evt="onPrev" delay="0">
-                  <p:tgtEl>
-                    <p:sldTgt/>
-                  </p:tgtEl>
-                </p:cond>
-              </p:prevCondLst>
-              <p:nextCondLst>
-                <p:cond evt="onNext" delay="0">
-                  <p:tgtEl>
-                    <p:sldTgt/>
-                  </p:tgtEl>
-                </p:cond>
-              </p:nextCondLst>
-            </p:seq>
-          </p:childTnLst>
-        </p:cTn>
-      </p:par>
-    </p:tnLst>
-    <p:bldLst>
-      <p:bldP spid="3" grpId="0" animBg="1"/>
-      <p:bldP spid="4" grpId="0" animBg="1"/>
-      <p:bldP spid="5" grpId="0" animBg="1"/>
-    </p:bldLst>
-  </p:timing>
 </p:sld>
 </file>
 
@@ -17231,25 +17281,18 @@
   <p:clrMapOvr>
     <a:masterClrMapping/>
   </p:clrMapOvr>
-  <mc:AlternateContent xmlns:mc="http://schemas.openxmlformats.org/markup-compatibility/2006">
-    <mc:Choice xmlns:p14="http://schemas.microsoft.com/office/powerpoint/2010/main" Requires="p14">
+  <mc:AlternateContent xmlns:mc="http://schemas.openxmlformats.org/markup-compatibility/2006" xmlns:p14="http://schemas.microsoft.com/office/powerpoint/2010/main">
+    <mc:Choice Requires="p14">
       <p:transition spd="med" p14:dur="700">
         <p:fade/>
       </p:transition>
     </mc:Choice>
-    <mc:Fallback>
+    <mc:Fallback xmlns="">
       <p:transition spd="med">
         <p:fade/>
       </p:transition>
     </mc:Fallback>
   </mc:AlternateContent>
-  <p:timing>
-    <p:tnLst>
-      <p:par>
-        <p:cTn id="1" dur="indefinite" restart="never" nodeType="tmRoot"/>
-      </p:par>
-    </p:tnLst>
-  </p:timing>
 </p:sld>
 </file>
 
@@ -17288,14 +17331,14 @@
           <a:lstStyle/>
           <a:p>
             <a:r>
-              <a:rPr lang="en-US" smtClean="0"/>
+              <a:rPr lang="en-US"/>
               <a:t>Introducing </a:t>
             </a:r>
             <a:br>
-              <a:rPr lang="en-US" smtClean="0"/>
+              <a:rPr lang="en-US"/>
             </a:br>
             <a:r>
-              <a:rPr lang="en-US" smtClean="0"/>
+              <a:rPr lang="en-US"/>
               <a:t>EF Core</a:t>
             </a:r>
             <a:endParaRPr lang="en-US" dirty="0"/>
@@ -17331,13 +17374,13 @@
   <p:clrMapOvr>
     <a:masterClrMapping/>
   </p:clrMapOvr>
-  <mc:AlternateContent xmlns:mc="http://schemas.openxmlformats.org/markup-compatibility/2006">
-    <mc:Choice xmlns:p14="http://schemas.microsoft.com/office/powerpoint/2010/main" Requires="p14">
+  <mc:AlternateContent xmlns:mc="http://schemas.openxmlformats.org/markup-compatibility/2006" xmlns:p14="http://schemas.microsoft.com/office/powerpoint/2010/main">
+    <mc:Choice Requires="p14">
       <p:transition spd="med" p14:dur="700">
         <p:fade/>
       </p:transition>
     </mc:Choice>
-    <mc:Fallback>
+    <mc:Fallback xmlns="">
       <p:transition spd="med">
         <p:fade/>
       </p:transition>
@@ -17454,13 +17497,13 @@
   <p:clrMapOvr>
     <a:masterClrMapping/>
   </p:clrMapOvr>
-  <mc:AlternateContent xmlns:mc="http://schemas.openxmlformats.org/markup-compatibility/2006">
-    <mc:Choice xmlns:p14="http://schemas.microsoft.com/office/powerpoint/2010/main" Requires="p14">
+  <mc:AlternateContent xmlns:mc="http://schemas.openxmlformats.org/markup-compatibility/2006" xmlns:p14="http://schemas.microsoft.com/office/powerpoint/2010/main">
+    <mc:Choice Requires="p14">
       <p:transition spd="med" p14:dur="700">
         <p:fade/>
       </p:transition>
     </mc:Choice>
-    <mc:Fallback>
+    <mc:Fallback xmlns="">
       <p:transition spd="med">
         <p:fade/>
       </p:transition>
@@ -17884,13 +17927,13 @@
   <p:clrMapOvr>
     <a:masterClrMapping/>
   </p:clrMapOvr>
-  <mc:AlternateContent xmlns:mc="http://schemas.openxmlformats.org/markup-compatibility/2006">
-    <mc:Choice xmlns:p14="http://schemas.microsoft.com/office/powerpoint/2010/main" Requires="p14">
+  <mc:AlternateContent xmlns:mc="http://schemas.openxmlformats.org/markup-compatibility/2006" xmlns:p14="http://schemas.microsoft.com/office/powerpoint/2010/main">
+    <mc:Choice Requires="p14">
       <p:transition spd="med" p14:dur="700">
         <p:fade/>
       </p:transition>
     </mc:Choice>
-    <mc:Fallback>
+    <mc:Fallback xmlns="">
       <p:transition spd="med">
         <p:fade/>
       </p:transition>
@@ -18453,20 +18496,12 @@
               <a:rPr lang="en-US" dirty="0"/>
               <a:t>Beginning work on </a:t>
             </a:r>
-            <a:r>
-              <a:rPr lang="en-US" dirty="0"/>
-              <a:t/>
-            </a:r>
             <a:br>
               <a:rPr lang="en-US" dirty="0"/>
             </a:br>
             <a:r>
-              <a:rPr lang="en-US" sz="1600" dirty="0" smtClean="0"/>
-              <a:t>(</a:t>
-            </a:r>
-            <a:r>
               <a:rPr lang="en-US" sz="1600" dirty="0"/>
-              <a:t>but not shipping in 1.1)</a:t>
+              <a:t>(but not shipping in 1.1)</a:t>
             </a:r>
           </a:p>
         </p:txBody>
@@ -18502,6 +18537,19 @@
               <a:rPr lang="en-US" dirty="0"/>
               <a:t>Simple type conversions </a:t>
             </a:r>
+            <a:r>
+              <a:rPr lang="en-US" dirty="0" smtClean="0"/>
+              <a:t>(</a:t>
+            </a:r>
+            <a:r>
+              <a:rPr lang="en-US" dirty="0" err="1" smtClean="0"/>
+              <a:t>json</a:t>
+            </a:r>
+            <a:r>
+              <a:rPr lang="en-US" dirty="0" smtClean="0"/>
+              <a:t> object &lt;-&gt; string)</a:t>
+            </a:r>
+            <a:endParaRPr lang="en-US" dirty="0"/>
           </a:p>
           <a:p>
             <a:pPr>
@@ -18524,13 +18572,13 @@
   <p:clrMapOvr>
     <a:masterClrMapping/>
   </p:clrMapOvr>
-  <mc:AlternateContent xmlns:mc="http://schemas.openxmlformats.org/markup-compatibility/2006">
-    <mc:Choice xmlns:p14="http://schemas.microsoft.com/office/powerpoint/2010/main" Requires="p14">
+  <mc:AlternateContent xmlns:mc="http://schemas.openxmlformats.org/markup-compatibility/2006" xmlns:p14="http://schemas.microsoft.com/office/powerpoint/2010/main">
+    <mc:Choice Requires="p14">
       <p:transition spd="med" p14:dur="700">
         <p:fade/>
       </p:transition>
     </mc:Choice>
-    <mc:Fallback>
+    <mc:Fallback xmlns="">
       <p:transition spd="med">
         <p:fade/>
       </p:transition>
@@ -19110,13 +19158,6 @@
       </p:transition>
     </mc:Fallback>
   </mc:AlternateContent>
-  <p:timing>
-    <p:tnLst>
-      <p:par>
-        <p:cTn id="1" dur="indefinite" restart="never" nodeType="tmRoot"/>
-      </p:par>
-    </p:tnLst>
-  </p:timing>
 </p:sld>
 </file>
 
@@ -19188,25 +19229,18 @@
   <p:clrMapOvr>
     <a:masterClrMapping/>
   </p:clrMapOvr>
-  <mc:AlternateContent xmlns:mc="http://schemas.openxmlformats.org/markup-compatibility/2006">
-    <mc:Choice xmlns:p14="http://schemas.microsoft.com/office/powerpoint/2010/main" Requires="p14">
+  <mc:AlternateContent xmlns:mc="http://schemas.openxmlformats.org/markup-compatibility/2006" xmlns:p14="http://schemas.microsoft.com/office/powerpoint/2010/main">
+    <mc:Choice Requires="p14">
       <p:transition spd="med" p14:dur="700">
         <p:fade/>
       </p:transition>
     </mc:Choice>
-    <mc:Fallback>
+    <mc:Fallback xmlns="">
       <p:transition spd="med">
         <p:fade/>
       </p:transition>
     </mc:Fallback>
   </mc:AlternateContent>
-  <p:timing>
-    <p:tnLst>
-      <p:par>
-        <p:cTn id="1" dur="indefinite" restart="never" nodeType="tmRoot"/>
-      </p:par>
-    </p:tnLst>
-  </p:timing>
 </p:sld>
 </file>
 
@@ -19308,19 +19342,19 @@
               <a:buNone/>
             </a:pPr>
             <a:r>
-              <a:rPr lang="en-US" dirty="0" smtClean="0"/>
+              <a:rPr lang="en-US" dirty="0"/>
               <a:t>github.com/</a:t>
             </a:r>
             <a:r>
-              <a:rPr lang="en-US" dirty="0" err="1" smtClean="0"/>
+              <a:rPr lang="en-US" dirty="0" err="1"/>
               <a:t>micdenny</a:t>
             </a:r>
             <a:r>
-              <a:rPr lang="en-US" dirty="0" smtClean="0"/>
+              <a:rPr lang="en-US" dirty="0"/>
               <a:t>/Demo-</a:t>
             </a:r>
             <a:r>
-              <a:rPr lang="en-US" dirty="0" err="1" smtClean="0"/>
+              <a:rPr lang="en-US" dirty="0" err="1"/>
               <a:t>EFCore</a:t>
             </a:r>
             <a:endParaRPr lang="en-US" dirty="0"/>
@@ -19337,13 +19371,13 @@
   <p:clrMapOvr>
     <a:masterClrMapping/>
   </p:clrMapOvr>
-  <mc:AlternateContent xmlns:mc="http://schemas.openxmlformats.org/markup-compatibility/2006">
-    <mc:Choice xmlns:p14="http://schemas.microsoft.com/office/powerpoint/2010/main" Requires="p14">
+  <mc:AlternateContent xmlns:mc="http://schemas.openxmlformats.org/markup-compatibility/2006" xmlns:p14="http://schemas.microsoft.com/office/powerpoint/2010/main">
+    <mc:Choice Requires="p14">
       <p:transition spd="med" p14:dur="700">
         <p:fade/>
       </p:transition>
     </mc:Choice>
-    <mc:Fallback>
+    <mc:Fallback xmlns="">
       <p:transition spd="med">
         <p:fade/>
       </p:transition>
@@ -19398,73 +19432,64 @@
           <a:p>
             <a:pPr lvl="0"/>
             <a:r>
-              <a:rPr lang="en" dirty="0"/>
+              <a:rPr lang="en" sz="1800" dirty="0"/>
               <a:t>Any questions?</a:t>
             </a:r>
           </a:p>
           <a:p>
             <a:pPr lvl="0"/>
-            <a:endParaRPr lang="en" dirty="0"/>
+            <a:endParaRPr lang="en" sz="1800" dirty="0"/>
           </a:p>
           <a:p>
             <a:pPr lvl="0"/>
             <a:r>
-              <a:rPr lang="en" dirty="0"/>
+              <a:rPr lang="en" sz="1800" dirty="0"/>
               <a:t>You can find me </a:t>
             </a:r>
             <a:r>
-              <a:rPr lang="it-IT" dirty="0"/>
-              <a:t>on:</a:t>
-            </a:r>
+              <a:rPr lang="it-IT" sz="1800" dirty="0"/>
+              <a:t>on</a:t>
+            </a:r>
+            <a:r>
+              <a:rPr lang="it-IT" sz="1800" dirty="0" smtClean="0"/>
+              <a:t>:</a:t>
+            </a:r>
+            <a:endParaRPr lang="it-IT" sz="1800" dirty="0"/>
           </a:p>
           <a:p>
             <a:pPr lvl="0"/>
             <a:r>
-              <a:rPr lang="it-IT" dirty="0"/>
-              <a:t>Blog: http://dennymichael.com</a:t>
-            </a:r>
+              <a:rPr lang="it-IT" sz="1800" dirty="0"/>
+              <a:t>Twitter: @</a:t>
+            </a:r>
+            <a:r>
+              <a:rPr lang="it-IT" sz="1800" dirty="0" err="1" smtClean="0"/>
+              <a:t>dennymic</a:t>
+            </a:r>
+            <a:endParaRPr lang="it-IT" sz="1800" dirty="0"/>
           </a:p>
           <a:p>
             <a:pPr lvl="0"/>
             <a:r>
-              <a:rPr lang="it-IT" dirty="0"/>
-              <a:t>Twitter: @</a:t>
-            </a:r>
-            <a:r>
-              <a:rPr lang="it-IT" dirty="0" err="1"/>
-              <a:t>dennymic</a:t>
-            </a:r>
-            <a:endParaRPr lang="it-IT" dirty="0"/>
+              <a:rPr lang="en" sz="1800" dirty="0"/>
+              <a:t>GitHub: </a:t>
+            </a:r>
+            <a:r>
+              <a:rPr lang="en" sz="1800" dirty="0" smtClean="0"/>
+              <a:t>micdenny</a:t>
+            </a:r>
           </a:p>
           <a:p>
             <a:pPr lvl="0"/>
             <a:r>
-              <a:rPr lang="it-IT" dirty="0"/>
-              <a:t>Facebook: 0v3rCl0ck (</a:t>
-            </a:r>
-            <a:r>
-              <a:rPr lang="it-IT" dirty="0" err="1"/>
-              <a:t>better</a:t>
-            </a:r>
-            <a:r>
-              <a:rPr lang="it-IT" dirty="0"/>
-              <a:t> </a:t>
-            </a:r>
-            <a:r>
-              <a:rPr lang="it-IT" dirty="0" err="1"/>
-              <a:t>search</a:t>
-            </a:r>
-            <a:r>
-              <a:rPr lang="it-IT" dirty="0"/>
-              <a:t> for Michael Denny)</a:t>
-            </a:r>
-          </a:p>
-          <a:p>
-            <a:pPr lvl="0"/>
-            <a:r>
-              <a:rPr lang="en" dirty="0"/>
-              <a:t>GitHub: micdenny</a:t>
-            </a:r>
+              <a:rPr lang="it-IT" sz="1800" dirty="0"/>
+              <a:t>Blog: http://</a:t>
+            </a:r>
+            <a:r>
+              <a:rPr lang="it-IT" sz="1800" dirty="0" smtClean="0"/>
+              <a:t>dennymichael.net</a:t>
+            </a:r>
+            <a:endParaRPr lang="en" sz="1800" dirty="0"/>
           </a:p>
         </p:txBody>
       </p:sp>
@@ -19496,25 +19521,38 @@
           </a:p>
         </p:txBody>
       </p:sp>
-      <p:sp>
-        <p:nvSpPr>
-          <p:cNvPr id="17" name="Content Placeholder 16"/>
-          <p:cNvSpPr>
-            <a:spLocks noGrp="1"/>
-          </p:cNvSpPr>
+      <p:pic>
+        <p:nvPicPr>
+          <p:cNvPr id="5" name="Content Placeholder 4"/>
+          <p:cNvPicPr>
+            <a:picLocks noGrp="1" noChangeAspect="1"/>
+          </p:cNvPicPr>
           <p:nvPr>
             <p:ph sz="quarter" idx="11"/>
           </p:nvPr>
-        </p:nvSpPr>
-        <p:spPr/>
-        <p:txBody>
-          <a:bodyPr/>
-          <a:lstStyle/>
-          <a:p>
-            <a:endParaRPr lang="it-IT"/>
-          </a:p>
-        </p:txBody>
-      </p:sp>
+        </p:nvPicPr>
+        <p:blipFill>
+          <a:blip r:embed="rId3">
+            <a:extLst>
+              <a:ext uri="{28A0092B-C50C-407E-A947-70E740481C1C}">
+                <a14:useLocalDpi xmlns:a14="http://schemas.microsoft.com/office/drawing/2010/main" val="0"/>
+              </a:ext>
+            </a:extLst>
+          </a:blip>
+          <a:stretch>
+            <a:fillRect/>
+          </a:stretch>
+        </p:blipFill>
+        <p:spPr>
+          <a:xfrm>
+            <a:off x="248042" y="711075"/>
+            <a:ext cx="2719601" cy="3588983"/>
+          </a:xfrm>
+          <a:prstGeom prst="rect">
+            <a:avLst/>
+          </a:prstGeom>
+        </p:spPr>
+      </p:pic>
     </p:spTree>
     <p:extLst>
       <p:ext uri="{BB962C8B-B14F-4D97-AF65-F5344CB8AC3E}">
@@ -19525,13 +19563,13 @@
   <p:clrMapOvr>
     <a:masterClrMapping/>
   </p:clrMapOvr>
-  <mc:AlternateContent xmlns:mc="http://schemas.openxmlformats.org/markup-compatibility/2006">
-    <mc:Choice xmlns:p15="http://schemas.microsoft.com/office/powerpoint/2012/main" Requires="p15">
+  <mc:AlternateContent xmlns:mc="http://schemas.openxmlformats.org/markup-compatibility/2006" xmlns:p15="http://schemas.microsoft.com/office/powerpoint/2012/main">
+    <mc:Choice Requires="p15">
       <p:transition xmlns:p14="http://schemas.microsoft.com/office/powerpoint/2010/main" spd="slow" p14:dur="6000">
         <p15:prstTrans prst="curtains"/>
       </p:transition>
     </mc:Choice>
-    <mc:Fallback>
+    <mc:Fallback xmlns="">
       <p:transition spd="slow">
         <p:fade/>
       </p:transition>
@@ -19708,13 +19746,13 @@
   <p:clrMapOvr>
     <a:masterClrMapping/>
   </p:clrMapOvr>
-  <mc:AlternateContent xmlns:mc="http://schemas.openxmlformats.org/markup-compatibility/2006">
-    <mc:Choice xmlns:p14="http://schemas.microsoft.com/office/powerpoint/2010/main" Requires="p14">
+  <mc:AlternateContent xmlns:mc="http://schemas.openxmlformats.org/markup-compatibility/2006" xmlns:p14="http://schemas.microsoft.com/office/powerpoint/2010/main">
+    <mc:Choice Requires="p14">
       <p:transition spd="med" p14:dur="700">
         <p:fade/>
       </p:transition>
     </mc:Choice>
-    <mc:Fallback>
+    <mc:Fallback xmlns="">
       <p:transition spd="med">
         <p:fade/>
       </p:transition>
@@ -21729,13 +21767,13 @@
   <p:clrMapOvr>
     <a:masterClrMapping/>
   </p:clrMapOvr>
-  <mc:AlternateContent xmlns:mc="http://schemas.openxmlformats.org/markup-compatibility/2006">
-    <mc:Choice xmlns:p14="http://schemas.microsoft.com/office/powerpoint/2010/main" Requires="p14">
+  <mc:AlternateContent xmlns:mc="http://schemas.openxmlformats.org/markup-compatibility/2006" xmlns:p14="http://schemas.microsoft.com/office/powerpoint/2010/main">
+    <mc:Choice Requires="p14">
       <p:transition spd="med" p14:dur="700">
         <p:fade/>
       </p:transition>
     </mc:Choice>
-    <mc:Fallback>
+    <mc:Fallback xmlns="">
       <p:transition spd="med">
         <p:fade/>
       </p:transition>
@@ -22693,7 +22731,7 @@
           <a:lstStyle/>
           <a:p>
             <a:r>
-              <a:rPr lang="en-US" dirty="0" smtClean="0"/>
+              <a:rPr lang="en-US" dirty="0"/>
               <a:t>New platforms</a:t>
             </a:r>
             <a:endParaRPr lang="it-IT" dirty="0"/>
@@ -22739,13 +22777,13 @@
   <p:clrMapOvr>
     <a:masterClrMapping/>
   </p:clrMapOvr>
-  <mc:AlternateContent xmlns:mc="http://schemas.openxmlformats.org/markup-compatibility/2006">
-    <mc:Choice xmlns:p14="http://schemas.microsoft.com/office/powerpoint/2010/main" Requires="p14">
+  <mc:AlternateContent xmlns:mc="http://schemas.openxmlformats.org/markup-compatibility/2006" xmlns:p14="http://schemas.microsoft.com/office/powerpoint/2010/main">
+    <mc:Choice Requires="p14">
       <p:transition spd="med" p14:dur="700">
         <p:fade/>
       </p:transition>
     </mc:Choice>
-    <mc:Fallback>
+    <mc:Fallback xmlns="">
       <p:transition spd="med">
         <p:fade/>
       </p:transition>
@@ -24149,13 +24187,13 @@
   <p:clrMapOvr>
     <a:masterClrMapping/>
   </p:clrMapOvr>
-  <mc:AlternateContent xmlns:mc="http://schemas.openxmlformats.org/markup-compatibility/2006">
-    <mc:Choice xmlns:p14="http://schemas.microsoft.com/office/powerpoint/2010/main" Requires="p14">
+  <mc:AlternateContent xmlns:mc="http://schemas.openxmlformats.org/markup-compatibility/2006" xmlns:p14="http://schemas.microsoft.com/office/powerpoint/2010/main">
+    <mc:Choice Requires="p14">
       <p:transition spd="med" p14:dur="700">
         <p:fade/>
       </p:transition>
     </mc:Choice>
-    <mc:Fallback>
+    <mc:Fallback xmlns="">
       <p:transition spd="med">
         <p:fade/>
       </p:transition>
@@ -24674,13 +24712,13 @@
   <p:clrMapOvr>
     <a:masterClrMapping/>
   </p:clrMapOvr>
-  <mc:AlternateContent xmlns:mc="http://schemas.openxmlformats.org/markup-compatibility/2006">
-    <mc:Choice xmlns:p14="http://schemas.microsoft.com/office/powerpoint/2010/main" Requires="p14">
+  <mc:AlternateContent xmlns:mc="http://schemas.openxmlformats.org/markup-compatibility/2006" xmlns:p14="http://schemas.microsoft.com/office/powerpoint/2010/main">
+    <mc:Choice Requires="p14">
       <p:transition spd="med" p14:dur="700">
         <p:fade/>
       </p:transition>
     </mc:Choice>
-    <mc:Fallback>
+    <mc:Fallback xmlns="">
       <p:transition spd="med">
         <p:fade/>
       </p:transition>
@@ -24729,7 +24767,7 @@
           <a:lstStyle/>
           <a:p>
             <a:r>
-              <a:rPr lang="en-US" smtClean="0"/>
+              <a:rPr lang="en-US"/>
               <a:t>New data stores</a:t>
             </a:r>
             <a:endParaRPr lang="en-US" dirty="0"/>
@@ -24755,7 +24793,7 @@
               <a:buNone/>
             </a:pPr>
             <a:r>
-              <a:rPr lang="en-US" sz="1800" dirty="0" smtClean="0">
+              <a:rPr lang="en-US" sz="1800" dirty="0">
                 <a:solidFill>
                   <a:srgbClr val="19BBD5"/>
                 </a:solidFill>
@@ -24769,7 +24807,7 @@
               <a:buNone/>
             </a:pPr>
             <a:r>
-              <a:rPr lang="en-US" sz="1200" dirty="0" smtClean="0">
+              <a:rPr lang="en-US" sz="1200" dirty="0">
                 <a:latin typeface="Muli" panose="020B0604020202020204" charset="0"/>
               </a:rPr>
               <a:t>Not a magic abstraction</a:t>
@@ -24780,7 +24818,7 @@
               <a:buNone/>
             </a:pPr>
             <a:r>
-              <a:rPr lang="en-US" sz="1200" dirty="0" smtClean="0">
+              <a:rPr lang="en-US" sz="1200" dirty="0">
                 <a:latin typeface="Muli" panose="020B0604020202020204" charset="0"/>
               </a:rPr>
               <a:t>High level services that are useful on all/most stores</a:t>
@@ -24791,7 +24829,7 @@
               <a:buNone/>
             </a:pPr>
             <a:r>
-              <a:rPr lang="en-US" sz="1200" dirty="0" smtClean="0">
+              <a:rPr lang="en-US" sz="1200" dirty="0">
                 <a:latin typeface="Muli" panose="020B0604020202020204" charset="0"/>
               </a:rPr>
               <a:t>Non-common concerns handled by provider extensions</a:t>
@@ -24801,7 +24839,7 @@
             <a:pPr>
               <a:buNone/>
             </a:pPr>
-            <a:endParaRPr lang="en-US" sz="1800" dirty="0" smtClean="0">
+            <a:endParaRPr lang="en-US" sz="1800" dirty="0">
               <a:latin typeface="Muli" panose="020B0604020202020204" charset="0"/>
             </a:endParaRPr>
           </a:p>
@@ -24810,7 +24848,7 @@
               <a:buNone/>
             </a:pPr>
             <a:r>
-              <a:rPr lang="en-US" sz="1800" dirty="0" smtClean="0">
+              <a:rPr lang="en-US" sz="1800" dirty="0">
                 <a:solidFill>
                   <a:srgbClr val="19BBD5"/>
                 </a:solidFill>
@@ -24824,10 +24862,22 @@
               <a:buNone/>
             </a:pPr>
             <a:r>
-              <a:rPr lang="en-US" sz="1200" dirty="0" smtClean="0">
+              <a:rPr lang="en-US" sz="1200" dirty="0">
                 <a:latin typeface="Muli" panose="020B0604020202020204" charset="0"/>
               </a:rPr>
-              <a:t>Relational (SQL Server, SQLite, Postgres, MySQL, SQL Compact etc.)</a:t>
+              <a:t>Relational (SQL Server, SQLite, Postgres, MySQL, SQL Compact, </a:t>
+            </a:r>
+            <a:r>
+              <a:rPr lang="en-US" sz="1200">
+                <a:latin typeface="Muli" panose="020B0604020202020204" charset="0"/>
+              </a:rPr>
+              <a:t>Oracle soon, </a:t>
+            </a:r>
+            <a:r>
+              <a:rPr lang="en-US" sz="1200" dirty="0">
+                <a:latin typeface="Muli" panose="020B0604020202020204" charset="0"/>
+              </a:rPr>
+              <a:t>etc.)</a:t>
             </a:r>
           </a:p>
           <a:p>
@@ -24835,7 +24885,7 @@
               <a:buNone/>
             </a:pPr>
             <a:r>
-              <a:rPr lang="en-US" sz="1200" dirty="0" smtClean="0">
+              <a:rPr lang="en-US" sz="1200" dirty="0">
                 <a:latin typeface="Muli" panose="020B0604020202020204" charset="0"/>
               </a:rPr>
               <a:t>In Memory (for testing)</a:t>
@@ -24846,7 +24896,7 @@
               <a:buNone/>
             </a:pPr>
             <a:r>
-              <a:rPr lang="en-US" sz="1200" dirty="0" smtClean="0">
+              <a:rPr lang="en-US" sz="1200" dirty="0">
                 <a:latin typeface="Muli" panose="020B0604020202020204" charset="0"/>
               </a:rPr>
               <a:t>Azure Table Storage (prototype)</a:t>
@@ -24857,13 +24907,13 @@
               <a:buNone/>
             </a:pPr>
             <a:r>
-              <a:rPr lang="en-US" sz="1200" dirty="0" err="1" smtClean="0">
+              <a:rPr lang="en-US" sz="1200" dirty="0" err="1">
                 <a:latin typeface="Muli" panose="020B0604020202020204" charset="0"/>
               </a:rPr>
               <a:t>Redis</a:t>
             </a:r>
             <a:r>
-              <a:rPr lang="en-US" sz="1200" dirty="0" smtClean="0">
+              <a:rPr lang="en-US" sz="1200" dirty="0">
                 <a:latin typeface="Muli" panose="020B0604020202020204" charset="0"/>
               </a:rPr>
               <a:t> (prototype)</a:t>
@@ -24873,7 +24923,7 @@
             <a:pPr>
               <a:buNone/>
             </a:pPr>
-            <a:endParaRPr lang="en-US" sz="1200" dirty="0" smtClean="0">
+            <a:endParaRPr lang="en-US" sz="1200" dirty="0">
               <a:gradFill>
                 <a:gsLst>
                   <a:gs pos="1250">
@@ -24893,7 +24943,7 @@
               <a:buNone/>
             </a:pPr>
             <a:r>
-              <a:rPr lang="en-US" sz="1800" dirty="0" smtClean="0">
+              <a:rPr lang="en-US" sz="1800" dirty="0">
                 <a:solidFill>
                   <a:srgbClr val="19BBD5"/>
                 </a:solidFill>
@@ -24901,12 +24951,6 @@
               </a:rPr>
               <a:t>Just relational providers for v1.0</a:t>
             </a:r>
-            <a:endParaRPr lang="en-US" sz="1800" dirty="0">
-              <a:solidFill>
-                <a:srgbClr val="19BBD5"/>
-              </a:solidFill>
-              <a:latin typeface="Muli" panose="020B0604020202020204" charset="0"/>
-            </a:endParaRPr>
           </a:p>
         </p:txBody>
       </p:sp>
@@ -24920,13 +24964,13 @@
   <p:clrMapOvr>
     <a:masterClrMapping/>
   </p:clrMapOvr>
-  <mc:AlternateContent xmlns:mc="http://schemas.openxmlformats.org/markup-compatibility/2006">
-    <mc:Choice xmlns:p14="http://schemas.microsoft.com/office/powerpoint/2010/main" Requires="p14">
+  <mc:AlternateContent xmlns:mc="http://schemas.openxmlformats.org/markup-compatibility/2006" xmlns:p14="http://schemas.microsoft.com/office/powerpoint/2010/main">
+    <mc:Choice Requires="p14">
       <p:transition spd="med" p14:dur="700">
         <p:fade/>
       </p:transition>
     </mc:Choice>
-    <mc:Fallback>
+    <mc:Fallback xmlns="">
       <p:transition spd="med">
         <p:fade/>
       </p:transition>

</xml_diff>